<commit_message>
Code Comments and Poster
</commit_message>
<xml_diff>
--- a/Poster.pptx
+++ b/Poster.pptx
@@ -5,10 +5,11 @@
     <p:sldMasterId id="2147483660" r:id="rId1"/>
   </p:sldMasterIdLst>
   <p:notesMasterIdLst>
-    <p:notesMasterId r:id="rId3"/>
+    <p:notesMasterId r:id="rId4"/>
   </p:notesMasterIdLst>
   <p:sldIdLst>
     <p:sldId id="257" r:id="rId2"/>
+    <p:sldId id="258" r:id="rId3"/>
   </p:sldIdLst>
   <p:sldSz cx="30275213" cy="42803763"/>
   <p:notesSz cx="6858000" cy="9144000"/>
@@ -208,7 +209,7 @@
           <a:p>
             <a:fld id="{BE36CDCD-2F24-4FC6-8D89-D255EE55885D}" type="datetimeFigureOut">
               <a:rPr lang="de-DE" smtClean="0"/>
-              <a:t>03.07.2025</a:t>
+              <a:t>05.07.2025</a:t>
             </a:fld>
             <a:endParaRPr lang="de-DE"/>
           </a:p>
@@ -584,6 +585,114 @@
 </p:notes>
 </file>
 
+<file path=ppt/notesSlides/notesSlide2.xml><?xml version="1.0" encoding="utf-8"?>
+<p:notes xmlns:a="http://schemas.openxmlformats.org/drawingml/2006/main" xmlns:r="http://schemas.openxmlformats.org/officeDocument/2006/relationships" xmlns:p="http://schemas.openxmlformats.org/presentationml/2006/main">
+  <p:cSld>
+    <p:spTree>
+      <p:nvGrpSpPr>
+        <p:cNvPr id="1" name="">
+          <a:extLst>
+            <a:ext uri="{FF2B5EF4-FFF2-40B4-BE49-F238E27FC236}">
+              <a16:creationId xmlns:a16="http://schemas.microsoft.com/office/drawing/2014/main" id="{429B1407-AC98-5FE4-31E8-CC6675DF84EF}"/>
+            </a:ext>
+          </a:extLst>
+        </p:cNvPr>
+        <p:cNvGrpSpPr/>
+        <p:nvPr/>
+      </p:nvGrpSpPr>
+      <p:grpSpPr>
+        <a:xfrm>
+          <a:off x="0" y="0"/>
+          <a:ext cx="0" cy="0"/>
+          <a:chOff x="0" y="0"/>
+          <a:chExt cx="0" cy="0"/>
+        </a:xfrm>
+      </p:grpSpPr>
+      <p:sp>
+        <p:nvSpPr>
+          <p:cNvPr id="2" name="Slide Image Placeholder 1">
+            <a:extLst>
+              <a:ext uri="{FF2B5EF4-FFF2-40B4-BE49-F238E27FC236}">
+                <a16:creationId xmlns:a16="http://schemas.microsoft.com/office/drawing/2014/main" id="{CA3B5E2A-A5E8-ED8A-863D-3A0505658F20}"/>
+              </a:ext>
+            </a:extLst>
+          </p:cNvPr>
+          <p:cNvSpPr>
+            <a:spLocks noGrp="1" noRot="1" noChangeAspect="1"/>
+          </p:cNvSpPr>
+          <p:nvPr>
+            <p:ph type="sldImg"/>
+          </p:nvPr>
+        </p:nvSpPr>
+        <p:spPr/>
+      </p:sp>
+      <p:sp>
+        <p:nvSpPr>
+          <p:cNvPr id="3" name="Notes Placeholder 2">
+            <a:extLst>
+              <a:ext uri="{FF2B5EF4-FFF2-40B4-BE49-F238E27FC236}">
+                <a16:creationId xmlns:a16="http://schemas.microsoft.com/office/drawing/2014/main" id="{53F57194-83E7-E772-3F6C-4E1F31308E59}"/>
+              </a:ext>
+            </a:extLst>
+          </p:cNvPr>
+          <p:cNvSpPr>
+            <a:spLocks noGrp="1"/>
+          </p:cNvSpPr>
+          <p:nvPr>
+            <p:ph type="body" idx="1"/>
+          </p:nvPr>
+        </p:nvSpPr>
+        <p:spPr/>
+        <p:txBody>
+          <a:bodyPr/>
+          <a:lstStyle/>
+          <a:p>
+            <a:endParaRPr lang="de-DE" dirty="0"/>
+          </a:p>
+        </p:txBody>
+      </p:sp>
+      <p:sp>
+        <p:nvSpPr>
+          <p:cNvPr id="4" name="Slide Number Placeholder 3">
+            <a:extLst>
+              <a:ext uri="{FF2B5EF4-FFF2-40B4-BE49-F238E27FC236}">
+                <a16:creationId xmlns:a16="http://schemas.microsoft.com/office/drawing/2014/main" id="{4562BCDB-03A3-FE4D-9530-26F83507649F}"/>
+              </a:ext>
+            </a:extLst>
+          </p:cNvPr>
+          <p:cNvSpPr>
+            <a:spLocks noGrp="1"/>
+          </p:cNvSpPr>
+          <p:nvPr>
+            <p:ph type="sldNum" sz="quarter" idx="5"/>
+          </p:nvPr>
+        </p:nvSpPr>
+        <p:spPr/>
+        <p:txBody>
+          <a:bodyPr/>
+          <a:lstStyle/>
+          <a:p>
+            <a:fld id="{C3DFFD0B-8A86-49B4-B585-C3C192A21CEB}" type="slidenum">
+              <a:rPr lang="de-DE" smtClean="0"/>
+              <a:t>2</a:t>
+            </a:fld>
+            <a:endParaRPr lang="de-DE"/>
+          </a:p>
+        </p:txBody>
+      </p:sp>
+    </p:spTree>
+    <p:extLst>
+      <p:ext uri="{BB962C8B-B14F-4D97-AF65-F5344CB8AC3E}">
+        <p14:creationId xmlns:p14="http://schemas.microsoft.com/office/powerpoint/2010/main" val="1955588201"/>
+      </p:ext>
+    </p:extLst>
+  </p:cSld>
+  <p:clrMapOvr>
+    <a:masterClrMapping/>
+  </p:clrMapOvr>
+</p:notes>
+</file>
+
 <file path=ppt/slideLayouts/slideLayout1.xml><?xml version="1.0" encoding="utf-8"?>
 <p:sldLayout xmlns:a="http://schemas.openxmlformats.org/drawingml/2006/main" xmlns:r="http://schemas.openxmlformats.org/officeDocument/2006/relationships" xmlns:p="http://schemas.openxmlformats.org/presentationml/2006/main" type="title" preserve="1">
   <p:cSld name="Title Slide">
@@ -715,7 +824,7 @@
           <a:p>
             <a:fld id="{61D7E66B-7281-C246-884E-91E9A1EB29D8}" type="datetimeFigureOut">
               <a:rPr lang="en-US" smtClean="0"/>
-              <a:t>7/3/2025</a:t>
+              <a:t>7/5/2025</a:t>
             </a:fld>
             <a:endParaRPr lang="en-US"/>
           </a:p>
@@ -885,7 +994,7 @@
           <a:p>
             <a:fld id="{61D7E66B-7281-C246-884E-91E9A1EB29D8}" type="datetimeFigureOut">
               <a:rPr lang="en-US" smtClean="0"/>
-              <a:t>7/3/2025</a:t>
+              <a:t>7/5/2025</a:t>
             </a:fld>
             <a:endParaRPr lang="en-US"/>
           </a:p>
@@ -1065,7 +1174,7 @@
           <a:p>
             <a:fld id="{61D7E66B-7281-C246-884E-91E9A1EB29D8}" type="datetimeFigureOut">
               <a:rPr lang="en-US" smtClean="0"/>
-              <a:t>7/3/2025</a:t>
+              <a:t>7/5/2025</a:t>
             </a:fld>
             <a:endParaRPr lang="en-US"/>
           </a:p>
@@ -1235,7 +1344,7 @@
           <a:p>
             <a:fld id="{61D7E66B-7281-C246-884E-91E9A1EB29D8}" type="datetimeFigureOut">
               <a:rPr lang="en-US" smtClean="0"/>
-              <a:t>7/3/2025</a:t>
+              <a:t>7/5/2025</a:t>
             </a:fld>
             <a:endParaRPr lang="en-US"/>
           </a:p>
@@ -1479,7 +1588,7 @@
           <a:p>
             <a:fld id="{61D7E66B-7281-C246-884E-91E9A1EB29D8}" type="datetimeFigureOut">
               <a:rPr lang="en-US" smtClean="0"/>
-              <a:t>7/3/2025</a:t>
+              <a:t>7/5/2025</a:t>
             </a:fld>
             <a:endParaRPr lang="en-US"/>
           </a:p>
@@ -1711,7 +1820,7 @@
           <a:p>
             <a:fld id="{61D7E66B-7281-C246-884E-91E9A1EB29D8}" type="datetimeFigureOut">
               <a:rPr lang="en-US" smtClean="0"/>
-              <a:t>7/3/2025</a:t>
+              <a:t>7/5/2025</a:t>
             </a:fld>
             <a:endParaRPr lang="en-US"/>
           </a:p>
@@ -2078,7 +2187,7 @@
           <a:p>
             <a:fld id="{61D7E66B-7281-C246-884E-91E9A1EB29D8}" type="datetimeFigureOut">
               <a:rPr lang="en-US" smtClean="0"/>
-              <a:t>7/3/2025</a:t>
+              <a:t>7/5/2025</a:t>
             </a:fld>
             <a:endParaRPr lang="en-US"/>
           </a:p>
@@ -2196,7 +2305,7 @@
           <a:p>
             <a:fld id="{61D7E66B-7281-C246-884E-91E9A1EB29D8}" type="datetimeFigureOut">
               <a:rPr lang="en-US" smtClean="0"/>
-              <a:t>7/3/2025</a:t>
+              <a:t>7/5/2025</a:t>
             </a:fld>
             <a:endParaRPr lang="en-US"/>
           </a:p>
@@ -2291,7 +2400,7 @@
           <a:p>
             <a:fld id="{61D7E66B-7281-C246-884E-91E9A1EB29D8}" type="datetimeFigureOut">
               <a:rPr lang="en-US" smtClean="0"/>
-              <a:t>7/3/2025</a:t>
+              <a:t>7/5/2025</a:t>
             </a:fld>
             <a:endParaRPr lang="en-US"/>
           </a:p>
@@ -2568,7 +2677,7 @@
           <a:p>
             <a:fld id="{61D7E66B-7281-C246-884E-91E9A1EB29D8}" type="datetimeFigureOut">
               <a:rPr lang="en-US" smtClean="0"/>
-              <a:t>7/3/2025</a:t>
+              <a:t>7/5/2025</a:t>
             </a:fld>
             <a:endParaRPr lang="en-US"/>
           </a:p>
@@ -2825,7 +2934,7 @@
           <a:p>
             <a:fld id="{61D7E66B-7281-C246-884E-91E9A1EB29D8}" type="datetimeFigureOut">
               <a:rPr lang="en-US" smtClean="0"/>
-              <a:t>7/3/2025</a:t>
+              <a:t>7/5/2025</a:t>
             </a:fld>
             <a:endParaRPr lang="en-US"/>
           </a:p>
@@ -3038,7 +3147,7 @@
           <a:p>
             <a:fld id="{61D7E66B-7281-C246-884E-91E9A1EB29D8}" type="datetimeFigureOut">
               <a:rPr lang="en-US" smtClean="0"/>
-              <a:t>7/3/2025</a:t>
+              <a:t>7/5/2025</a:t>
             </a:fld>
             <a:endParaRPr lang="en-US"/>
           </a:p>
@@ -7491,6 +7600,132 @@
 </p:sld>
 </file>
 
+<file path=ppt/slides/slide2.xml><?xml version="1.0" encoding="utf-8"?>
+<p:sld xmlns:a="http://schemas.openxmlformats.org/drawingml/2006/main" xmlns:r="http://schemas.openxmlformats.org/officeDocument/2006/relationships" xmlns:p="http://schemas.openxmlformats.org/presentationml/2006/main">
+  <p:cSld>
+    <p:spTree>
+      <p:nvGrpSpPr>
+        <p:cNvPr id="1" name="">
+          <a:extLst>
+            <a:ext uri="{FF2B5EF4-FFF2-40B4-BE49-F238E27FC236}">
+              <a16:creationId xmlns:a16="http://schemas.microsoft.com/office/drawing/2014/main" id="{795255B0-F5DE-E2B0-8EB8-4413DBB4EB9E}"/>
+            </a:ext>
+          </a:extLst>
+        </p:cNvPr>
+        <p:cNvGrpSpPr/>
+        <p:nvPr/>
+      </p:nvGrpSpPr>
+      <p:grpSpPr>
+        <a:xfrm>
+          <a:off x="0" y="0"/>
+          <a:ext cx="0" cy="0"/>
+          <a:chOff x="0" y="0"/>
+          <a:chExt cx="0" cy="0"/>
+        </a:xfrm>
+      </p:grpSpPr>
+      <p:pic>
+        <p:nvPicPr>
+          <p:cNvPr id="30" name="Picture 29" descr="A blue circle with red and green circles&#10;&#10;AI-generated content may be incorrect.">
+            <a:extLst>
+              <a:ext uri="{FF2B5EF4-FFF2-40B4-BE49-F238E27FC236}">
+                <a16:creationId xmlns:a16="http://schemas.microsoft.com/office/drawing/2014/main" id="{11B8F9EB-5AC4-FCB7-2531-F59FE1F23CDC}"/>
+              </a:ext>
+            </a:extLst>
+          </p:cNvPr>
+          <p:cNvPicPr>
+            <a:picLocks noChangeAspect="1"/>
+          </p:cNvPicPr>
+          <p:nvPr/>
+        </p:nvPicPr>
+        <p:blipFill>
+          <a:blip r:embed="rId3"/>
+          <a:stretch>
+            <a:fillRect/>
+          </a:stretch>
+        </p:blipFill>
+        <p:spPr>
+          <a:xfrm>
+            <a:off x="5288291" y="5513894"/>
+            <a:ext cx="6668431" cy="4115374"/>
+          </a:xfrm>
+          <a:prstGeom prst="rect">
+            <a:avLst/>
+          </a:prstGeom>
+        </p:spPr>
+      </p:pic>
+      <p:pic>
+        <p:nvPicPr>
+          <p:cNvPr id="38" name="Picture 37" descr="A blue circle with a number of different colored lines&#10;&#10;AI-generated content may be incorrect.">
+            <a:extLst>
+              <a:ext uri="{FF2B5EF4-FFF2-40B4-BE49-F238E27FC236}">
+                <a16:creationId xmlns:a16="http://schemas.microsoft.com/office/drawing/2014/main" id="{5463A472-1C21-E178-A553-47B40777124E}"/>
+              </a:ext>
+            </a:extLst>
+          </p:cNvPr>
+          <p:cNvPicPr>
+            <a:picLocks noChangeAspect="1"/>
+          </p:cNvPicPr>
+          <p:nvPr/>
+        </p:nvPicPr>
+        <p:blipFill>
+          <a:blip r:embed="rId4"/>
+          <a:stretch>
+            <a:fillRect/>
+          </a:stretch>
+        </p:blipFill>
+        <p:spPr>
+          <a:xfrm>
+            <a:off x="5288291" y="10885994"/>
+            <a:ext cx="6668431" cy="4115374"/>
+          </a:xfrm>
+          <a:prstGeom prst="rect">
+            <a:avLst/>
+          </a:prstGeom>
+        </p:spPr>
+      </p:pic>
+      <p:pic>
+        <p:nvPicPr>
+          <p:cNvPr id="42" name="Picture 41" descr="A blue pie chart with red and green circles&#10;&#10;AI-generated content may be incorrect.">
+            <a:extLst>
+              <a:ext uri="{FF2B5EF4-FFF2-40B4-BE49-F238E27FC236}">
+                <a16:creationId xmlns:a16="http://schemas.microsoft.com/office/drawing/2014/main" id="{81EE9FCF-780D-3734-ACF4-944385396C65}"/>
+              </a:ext>
+            </a:extLst>
+          </p:cNvPr>
+          <p:cNvPicPr>
+            <a:picLocks noChangeAspect="1"/>
+          </p:cNvPicPr>
+          <p:nvPr/>
+        </p:nvPicPr>
+        <p:blipFill>
+          <a:blip r:embed="rId5"/>
+          <a:stretch>
+            <a:fillRect/>
+          </a:stretch>
+        </p:blipFill>
+        <p:spPr>
+          <a:xfrm>
+            <a:off x="18318491" y="5513894"/>
+            <a:ext cx="6668431" cy="4115374"/>
+          </a:xfrm>
+          <a:prstGeom prst="rect">
+            <a:avLst/>
+          </a:prstGeom>
+        </p:spPr>
+      </p:pic>
+    </p:spTree>
+    <p:extLst>
+      <p:ext uri="{BB962C8B-B14F-4D97-AF65-F5344CB8AC3E}">
+        <p14:creationId xmlns:p14="http://schemas.microsoft.com/office/powerpoint/2010/main" val="496950899"/>
+      </p:ext>
+    </p:extLst>
+  </p:cSld>
+  <p:clrMapOvr>
+    <a:masterClrMapping/>
+  </p:clrMapOvr>
+</p:sld>
+</file>
+
 <file path=ppt/theme/theme1.xml><?xml version="1.0" encoding="utf-8"?>
 <a:theme xmlns:a="http://schemas.openxmlformats.org/drawingml/2006/main" name="Office Theme">
   <a:themeElements>

</xml_diff>

<commit_message>
Bilder in Poster ersetzt
</commit_message>
<xml_diff>
--- a/Poster.pptx
+++ b/Poster.pptx
@@ -3548,7 +3548,7 @@
         </p:nvSpPr>
         <p:spPr>
           <a:xfrm>
-            <a:off x="619433" y="27643718"/>
+            <a:off x="568333" y="27643718"/>
             <a:ext cx="14518173" cy="14571082"/>
           </a:xfrm>
           <a:prstGeom prst="roundRect">
@@ -3900,183 +3900,6 @@
       </p:sp>
       <p:sp>
         <p:nvSpPr>
-          <p:cNvPr id="16" name="TextBox 15">
-            <a:extLst>
-              <a:ext uri="{FF2B5EF4-FFF2-40B4-BE49-F238E27FC236}">
-                <a16:creationId xmlns:a16="http://schemas.microsoft.com/office/drawing/2014/main" id="{E5A8A780-8963-9A01-2654-83972EA67C12}"/>
-              </a:ext>
-            </a:extLst>
-          </p:cNvPr>
-          <p:cNvSpPr txBox="1"/>
-          <p:nvPr/>
-        </p:nvSpPr>
-        <p:spPr>
-          <a:xfrm>
-            <a:off x="1194287" y="16177658"/>
-            <a:ext cx="24173364" cy="7109639"/>
-          </a:xfrm>
-          <a:prstGeom prst="rect">
-            <a:avLst/>
-          </a:prstGeom>
-          <a:noFill/>
-          <a:ln>
-            <a:noFill/>
-          </a:ln>
-        </p:spPr>
-        <p:txBody>
-          <a:bodyPr wrap="square">
-            <a:spAutoFit/>
-          </a:bodyPr>
-          <a:lstStyle/>
-          <a:p>
-            <a:r>
-              <a:rPr lang="en-GB" sz="2400" b="1" noProof="0" dirty="0"/>
-              <a:t>1) Data preparation</a:t>
-            </a:r>
-          </a:p>
-          <a:p>
-            <a:pPr marL="457200" indent="-457200">
-              <a:buFont typeface="Arial" panose="020B0604020202020204" pitchFamily="34" charset="0"/>
-              <a:buChar char="•"/>
-            </a:pPr>
-            <a:r>
-              <a:rPr lang="en-GB" sz="2400" noProof="0" dirty="0"/>
-              <a:t>Data cleanup</a:t>
-            </a:r>
-          </a:p>
-          <a:p>
-            <a:pPr marL="457200" indent="-457200">
-              <a:buFont typeface="Arial" panose="020B0604020202020204" pitchFamily="34" charset="0"/>
-              <a:buChar char="•"/>
-            </a:pPr>
-            <a:r>
-              <a:rPr lang="en-GB" sz="2400" noProof="0" dirty="0"/>
-              <a:t>“Rearrange and reorder the columns to their treatment, replicate and fraction”</a:t>
-            </a:r>
-          </a:p>
-          <a:p>
-            <a:pPr marL="457200" indent="-457200">
-              <a:buFont typeface="Arial" panose="020B0604020202020204" pitchFamily="34" charset="0"/>
-              <a:buChar char="•"/>
-            </a:pPr>
-            <a:r>
-              <a:rPr lang="en-GB" sz="2400" noProof="0" dirty="0"/>
-              <a:t>Normalization</a:t>
-            </a:r>
-          </a:p>
-          <a:p>
-            <a:endParaRPr lang="en-GB" sz="2400" b="1" noProof="0" dirty="0"/>
-          </a:p>
-          <a:p>
-            <a:r>
-              <a:rPr lang="en-GB" sz="2400" b="1" noProof="0" dirty="0"/>
-              <a:t>2) Data exploration</a:t>
-            </a:r>
-            <a:endParaRPr lang="en-GB" sz="2400" noProof="0" dirty="0"/>
-          </a:p>
-          <a:p>
-            <a:pPr marL="457200" indent="-457200">
-              <a:buFont typeface="Arial" panose="020B0604020202020204" pitchFamily="34" charset="0"/>
-              <a:buChar char="•"/>
-            </a:pPr>
-            <a:r>
-              <a:rPr lang="en-GB" sz="2400" noProof="0" dirty="0"/>
-              <a:t> Identification of maxima and shoulders</a:t>
-            </a:r>
-          </a:p>
-          <a:p>
-            <a:pPr marL="457200" indent="-457200">
-              <a:buFont typeface="Arial" panose="020B0604020202020204" pitchFamily="34" charset="0"/>
-              <a:buChar char="•"/>
-            </a:pPr>
-            <a:r>
-              <a:rPr lang="en-GB" sz="2400" noProof="0" dirty="0"/>
-              <a:t> Selection criteria &amp; Wilcoxon Test </a:t>
-            </a:r>
-          </a:p>
-          <a:p>
-            <a:pPr marL="457200" indent="-457200">
-              <a:buFont typeface="Arial" panose="020B0604020202020204" pitchFamily="34" charset="0"/>
-              <a:buChar char="•"/>
-            </a:pPr>
-            <a:r>
-              <a:rPr lang="en-GB" sz="2400" noProof="0" dirty="0"/>
-              <a:t>Visualization for the order of selection criteria</a:t>
-            </a:r>
-          </a:p>
-          <a:p>
-            <a:pPr marL="457200" indent="-457200">
-              <a:buFont typeface="Arial" panose="020B0604020202020204" pitchFamily="34" charset="0"/>
-              <a:buChar char="•"/>
-            </a:pPr>
-            <a:r>
-              <a:rPr lang="en-GB" sz="2400" noProof="0" dirty="0"/>
-              <a:t>Pie charts for selection results</a:t>
-            </a:r>
-          </a:p>
-          <a:p>
-            <a:endParaRPr lang="en-GB" sz="2400" b="1" noProof="0" dirty="0"/>
-          </a:p>
-          <a:p>
-            <a:r>
-              <a:rPr lang="en-GB" sz="2400" b="1" noProof="0" dirty="0"/>
-              <a:t>3) Data reduction</a:t>
-            </a:r>
-          </a:p>
-          <a:p>
-            <a:pPr marL="457200" indent="-457200">
-              <a:buFont typeface="Arial" panose="020B0604020202020204" pitchFamily="34" charset="0"/>
-              <a:buChar char="•"/>
-            </a:pPr>
-            <a:r>
-              <a:rPr lang="en-GB" sz="2400" noProof="0" dirty="0"/>
-              <a:t>PCR </a:t>
-            </a:r>
-          </a:p>
-          <a:p>
-            <a:pPr marL="457200" indent="-457200">
-              <a:buFont typeface="Arial" panose="020B0604020202020204" pitchFamily="34" charset="0"/>
-              <a:buChar char="•"/>
-            </a:pPr>
-            <a:r>
-              <a:rPr lang="en-GB" sz="2400" noProof="0" dirty="0"/>
-              <a:t> k-means clustering</a:t>
-            </a:r>
-          </a:p>
-          <a:p>
-            <a:pPr marL="457200" indent="-457200">
-              <a:buFont typeface="Arial" panose="020B0604020202020204" pitchFamily="34" charset="0"/>
-              <a:buChar char="•"/>
-            </a:pPr>
-            <a:endParaRPr lang="en-GB" sz="2400" noProof="0" dirty="0"/>
-          </a:p>
-          <a:p>
-            <a:r>
-              <a:rPr lang="en-GB" sz="2400" b="1" noProof="0" dirty="0"/>
-              <a:t>4) Data modelling</a:t>
-            </a:r>
-          </a:p>
-          <a:p>
-            <a:pPr marL="457200" indent="-457200">
-              <a:buFont typeface="Arial" panose="020B0604020202020204" pitchFamily="34" charset="0"/>
-              <a:buChar char="•"/>
-            </a:pPr>
-            <a:r>
-              <a:rPr lang="en-GB" sz="2400" noProof="0" dirty="0"/>
-              <a:t> Linear Regression Analyses</a:t>
-            </a:r>
-            <a:endParaRPr lang="en-GB" sz="2400" b="1" noProof="0" dirty="0"/>
-          </a:p>
-          <a:p>
-            <a:endParaRPr lang="en-GB" sz="2400" b="1" noProof="0" dirty="0"/>
-          </a:p>
-          <a:p>
-            <a:endParaRPr lang="en-GB" sz="2400" b="1" noProof="0" dirty="0"/>
-          </a:p>
-        </p:txBody>
-      </p:sp>
-      <p:sp>
-        <p:nvSpPr>
           <p:cNvPr id="18" name="TextBox 17">
             <a:extLst>
               <a:ext uri="{FF2B5EF4-FFF2-40B4-BE49-F238E27FC236}">
@@ -5338,720 +5161,6 @@
           </a:prstGeom>
         </p:spPr>
       </p:pic>
-      <p:grpSp>
-        <p:nvGrpSpPr>
-          <p:cNvPr id="97" name="Group 96">
-            <a:extLst>
-              <a:ext uri="{FF2B5EF4-FFF2-40B4-BE49-F238E27FC236}">
-                <a16:creationId xmlns:a16="http://schemas.microsoft.com/office/drawing/2014/main" id="{CAC4F27D-C566-F3E2-60DD-4FDC15B3346E}"/>
-              </a:ext>
-            </a:extLst>
-          </p:cNvPr>
-          <p:cNvGrpSpPr/>
-          <p:nvPr/>
-        </p:nvGrpSpPr>
-        <p:grpSpPr>
-          <a:xfrm>
-            <a:off x="11999198" y="16210552"/>
-            <a:ext cx="17171804" cy="8336937"/>
-            <a:chOff x="11999198" y="16210552"/>
-            <a:chExt cx="17171804" cy="8336937"/>
-          </a:xfrm>
-        </p:grpSpPr>
-        <p:sp>
-          <p:nvSpPr>
-            <p:cNvPr id="26" name="TextBox 25">
-              <a:extLst>
-                <a:ext uri="{FF2B5EF4-FFF2-40B4-BE49-F238E27FC236}">
-                  <a16:creationId xmlns:a16="http://schemas.microsoft.com/office/drawing/2014/main" id="{BBD929F6-B5A7-A81C-BEB9-99F0DAA2B990}"/>
-                </a:ext>
-              </a:extLst>
-            </p:cNvPr>
-            <p:cNvSpPr txBox="1"/>
-            <p:nvPr/>
-          </p:nvSpPr>
-          <p:spPr>
-            <a:xfrm>
-              <a:off x="12014188" y="22608497"/>
-              <a:ext cx="17156702" cy="1938992"/>
-            </a:xfrm>
-            <a:prstGeom prst="rect">
-              <a:avLst/>
-            </a:prstGeom>
-            <a:noFill/>
-          </p:spPr>
-          <p:txBody>
-            <a:bodyPr wrap="square" rtlCol="0">
-              <a:spAutoFit/>
-            </a:bodyPr>
-            <a:lstStyle/>
-            <a:p>
-              <a:pPr algn="just"/>
-              <a:r>
-                <a:rPr lang="en-GB" sz="2000" b="1" noProof="0" dirty="0"/>
-                <a:t>Fig. 5 </a:t>
-              </a:r>
-              <a:r>
-                <a:rPr lang="en-GB" sz="2000" noProof="0" dirty="0"/>
-                <a:t>Principle Component Analyses and </a:t>
-              </a:r>
-              <a:r>
-                <a:rPr lang="en-GB" sz="2000" noProof="0" dirty="0" err="1"/>
-                <a:t>Elbowplots</a:t>
-              </a:r>
-              <a:r>
-                <a:rPr lang="en-GB" sz="2000" noProof="0" dirty="0"/>
-                <a:t> of the selected and the non-selected proteins. RNASE and CTRL are plotted separately for comparison.</a:t>
-              </a:r>
-            </a:p>
-            <a:p>
-              <a:pPr algn="just"/>
-              <a:endParaRPr lang="en-GB" sz="2000" noProof="0" dirty="0"/>
-            </a:p>
-            <a:p>
-              <a:pPr algn="just"/>
-              <a:r>
-                <a:rPr lang="en-GB" sz="2000" b="1" noProof="0" dirty="0"/>
-                <a:t>A) </a:t>
-              </a:r>
-              <a:r>
-                <a:rPr lang="en-GB" sz="2000" noProof="0" dirty="0"/>
-                <a:t>PCA of the selected proteins. The data points of the RNASE compared to the CTRL </a:t>
-              </a:r>
-              <a:r>
-                <a:rPr lang="en-GB" sz="2000" dirty="0"/>
-                <a:t>make up an overall similar shape</a:t>
-              </a:r>
-              <a:r>
-                <a:rPr lang="en-GB" sz="2000" noProof="0" dirty="0"/>
-                <a:t>, but a shift is visible in the density of the points. </a:t>
-              </a:r>
-              <a:r>
-                <a:rPr lang="en-GB" sz="2000" b="1" noProof="0" dirty="0"/>
-                <a:t>B) </a:t>
-              </a:r>
-              <a:r>
-                <a:rPr lang="en-GB" sz="2000" noProof="0" dirty="0"/>
-                <a:t>PCA</a:t>
-              </a:r>
-              <a:r>
-                <a:rPr lang="en-GB" sz="2000" b="1" noProof="0" dirty="0"/>
-                <a:t> </a:t>
-              </a:r>
-              <a:r>
-                <a:rPr lang="en-GB" sz="2000" noProof="0" dirty="0"/>
-                <a:t>of the non-selected proteins. The points of the RNASE and CTRL form mostly the same structure. </a:t>
-              </a:r>
-              <a:r>
-                <a:rPr lang="en-GB" sz="2000" b="1" noProof="0" dirty="0"/>
-                <a:t>C) </a:t>
-              </a:r>
-              <a:r>
-                <a:rPr lang="en-GB" sz="2000" noProof="0" dirty="0"/>
-                <a:t>Elbow-Plot of the selected proteins. The </a:t>
-              </a:r>
-              <a:r>
-                <a:rPr lang="en-GB" sz="2000" dirty="0" err="1"/>
-                <a:t>knick</a:t>
-              </a:r>
-              <a:r>
-                <a:rPr lang="en-GB" sz="2000" noProof="0" dirty="0"/>
-                <a:t> of the elbow is at 3. </a:t>
-              </a:r>
-              <a:r>
-                <a:rPr lang="en-GB" sz="2000" b="1" noProof="0" dirty="0"/>
-                <a:t>D) </a:t>
-              </a:r>
-              <a:r>
-                <a:rPr lang="en-GB" sz="2000" noProof="0" dirty="0"/>
-                <a:t>Elbow-Plot of the non-selected proteins. The </a:t>
-              </a:r>
-              <a:r>
-                <a:rPr lang="en-GB" sz="2000" dirty="0" err="1"/>
-                <a:t>knick</a:t>
-              </a:r>
-              <a:r>
-                <a:rPr lang="en-GB" sz="2000" noProof="0" dirty="0"/>
-                <a:t> of the elbow is between 3 and 4. To compare selected and non-selected proteins, we decided to use 3 cluster in the </a:t>
-              </a:r>
-              <a:r>
-                <a:rPr lang="en-GB" sz="2000" noProof="0" dirty="0" err="1"/>
-                <a:t>kmeans</a:t>
-              </a:r>
-              <a:r>
-                <a:rPr lang="en-GB" sz="2000" noProof="0" dirty="0"/>
-                <a:t> clustering.</a:t>
-              </a:r>
-            </a:p>
-          </p:txBody>
-        </p:sp>
-        <p:grpSp>
-          <p:nvGrpSpPr>
-            <p:cNvPr id="96" name="Group 95">
-              <a:extLst>
-                <a:ext uri="{FF2B5EF4-FFF2-40B4-BE49-F238E27FC236}">
-                  <a16:creationId xmlns:a16="http://schemas.microsoft.com/office/drawing/2014/main" id="{26E31626-5BFC-00E0-2920-C6873C4A60FD}"/>
-                </a:ext>
-              </a:extLst>
-            </p:cNvPr>
-            <p:cNvGrpSpPr/>
-            <p:nvPr/>
-          </p:nvGrpSpPr>
-          <p:grpSpPr>
-            <a:xfrm>
-              <a:off x="11999198" y="16210552"/>
-              <a:ext cx="17171804" cy="6231538"/>
-              <a:chOff x="11999198" y="16210552"/>
-              <a:chExt cx="17171804" cy="6231538"/>
-            </a:xfrm>
-          </p:grpSpPr>
-          <p:grpSp>
-            <p:nvGrpSpPr>
-              <p:cNvPr id="92" name="Group 91">
-                <a:extLst>
-                  <a:ext uri="{FF2B5EF4-FFF2-40B4-BE49-F238E27FC236}">
-                    <a16:creationId xmlns:a16="http://schemas.microsoft.com/office/drawing/2014/main" id="{1C4773DC-4C2F-3A94-1195-A4CE3265522B}"/>
-                  </a:ext>
-                </a:extLst>
-              </p:cNvPr>
-              <p:cNvGrpSpPr/>
-              <p:nvPr/>
-            </p:nvGrpSpPr>
-            <p:grpSpPr>
-              <a:xfrm>
-                <a:off x="11999198" y="16218869"/>
-                <a:ext cx="8344258" cy="2933489"/>
-                <a:chOff x="12458450" y="16216461"/>
-                <a:chExt cx="8344258" cy="2933489"/>
-              </a:xfrm>
-            </p:grpSpPr>
-            <p:pic>
-              <p:nvPicPr>
-                <p:cNvPr id="34" name="Picture 33" descr="A diagram of a graph&#10;&#10;AI-generated content may be incorrect.">
-                  <a:extLst>
-                    <a:ext uri="{FF2B5EF4-FFF2-40B4-BE49-F238E27FC236}">
-                      <a16:creationId xmlns:a16="http://schemas.microsoft.com/office/drawing/2014/main" id="{DF874E4B-ABF5-E1C6-72B3-A765590BDEA2}"/>
-                    </a:ext>
-                  </a:extLst>
-                </p:cNvPr>
-                <p:cNvPicPr>
-                  <a:picLocks noChangeAspect="1"/>
-                </p:cNvPicPr>
-                <p:nvPr/>
-              </p:nvPicPr>
-              <p:blipFill>
-                <a:blip r:embed="rId5"/>
-                <a:stretch>
-                  <a:fillRect/>
-                </a:stretch>
-              </p:blipFill>
-              <p:spPr>
-                <a:xfrm>
-                  <a:off x="12458450" y="16289018"/>
-                  <a:ext cx="4178110" cy="2856244"/>
-                </a:xfrm>
-                <a:prstGeom prst="rect">
-                  <a:avLst/>
-                </a:prstGeom>
-              </p:spPr>
-            </p:pic>
-            <p:pic>
-              <p:nvPicPr>
-                <p:cNvPr id="41" name="Picture 40" descr="A diagram of a graph showing a number of dots&#10;&#10;AI-generated content may be incorrect.">
-                  <a:extLst>
-                    <a:ext uri="{FF2B5EF4-FFF2-40B4-BE49-F238E27FC236}">
-                      <a16:creationId xmlns:a16="http://schemas.microsoft.com/office/drawing/2014/main" id="{F3319957-4CD1-3632-7671-D1837533B71D}"/>
-                    </a:ext>
-                  </a:extLst>
-                </p:cNvPr>
-                <p:cNvPicPr>
-                  <a:picLocks noChangeAspect="1"/>
-                </p:cNvPicPr>
-                <p:nvPr/>
-              </p:nvPicPr>
-              <p:blipFill>
-                <a:blip r:embed="rId6"/>
-                <a:stretch>
-                  <a:fillRect/>
-                </a:stretch>
-              </p:blipFill>
-              <p:spPr>
-                <a:xfrm>
-                  <a:off x="16624594" y="16293705"/>
-                  <a:ext cx="4178114" cy="2856245"/>
-                </a:xfrm>
-                <a:prstGeom prst="rect">
-                  <a:avLst/>
-                </a:prstGeom>
-              </p:spPr>
-            </p:pic>
-            <p:sp>
-              <p:nvSpPr>
-                <p:cNvPr id="45" name="TextBox 44">
-                  <a:extLst>
-                    <a:ext uri="{FF2B5EF4-FFF2-40B4-BE49-F238E27FC236}">
-                      <a16:creationId xmlns:a16="http://schemas.microsoft.com/office/drawing/2014/main" id="{673F2A36-1B4B-C4E7-1EE9-A5B6221FDC7B}"/>
-                    </a:ext>
-                  </a:extLst>
-                </p:cNvPr>
-                <p:cNvSpPr txBox="1"/>
-                <p:nvPr/>
-              </p:nvSpPr>
-              <p:spPr>
-                <a:xfrm>
-                  <a:off x="12733005" y="16216461"/>
-                  <a:ext cx="558327" cy="461665"/>
-                </a:xfrm>
-                <a:prstGeom prst="rect">
-                  <a:avLst/>
-                </a:prstGeom>
-                <a:noFill/>
-              </p:spPr>
-              <p:txBody>
-                <a:bodyPr wrap="square" rtlCol="0">
-                  <a:spAutoFit/>
-                </a:bodyPr>
-                <a:lstStyle/>
-                <a:p>
-                  <a:r>
-                    <a:rPr lang="en-GB" sz="2400" b="1" noProof="0" dirty="0"/>
-                    <a:t>5A</a:t>
-                  </a:r>
-                </a:p>
-              </p:txBody>
-            </p:sp>
-          </p:grpSp>
-          <p:grpSp>
-            <p:nvGrpSpPr>
-              <p:cNvPr id="93" name="Group 92">
-                <a:extLst>
-                  <a:ext uri="{FF2B5EF4-FFF2-40B4-BE49-F238E27FC236}">
-                    <a16:creationId xmlns:a16="http://schemas.microsoft.com/office/drawing/2014/main" id="{A2311E2E-F7A2-DD5D-FA9E-6A88BB4AA299}"/>
-                  </a:ext>
-                </a:extLst>
-              </p:cNvPr>
-              <p:cNvGrpSpPr/>
-              <p:nvPr/>
-            </p:nvGrpSpPr>
-            <p:grpSpPr>
-              <a:xfrm>
-                <a:off x="20808689" y="16210552"/>
-                <a:ext cx="8362201" cy="2950021"/>
-                <a:chOff x="20808689" y="16210552"/>
-                <a:chExt cx="8362201" cy="2950021"/>
-              </a:xfrm>
-            </p:grpSpPr>
-            <p:pic>
-              <p:nvPicPr>
-                <p:cNvPr id="36" name="Picture 35" descr="A graph of a curve&#10;&#10;AI-generated content may be incorrect.">
-                  <a:extLst>
-                    <a:ext uri="{FF2B5EF4-FFF2-40B4-BE49-F238E27FC236}">
-                      <a16:creationId xmlns:a16="http://schemas.microsoft.com/office/drawing/2014/main" id="{B10BE131-7D38-635B-20B6-412EEF3AB14C}"/>
-                    </a:ext>
-                  </a:extLst>
-                </p:cNvPr>
-                <p:cNvPicPr>
-                  <a:picLocks noChangeAspect="1"/>
-                </p:cNvPicPr>
-                <p:nvPr/>
-              </p:nvPicPr>
-              <p:blipFill>
-                <a:blip r:embed="rId7"/>
-                <a:stretch>
-                  <a:fillRect/>
-                </a:stretch>
-              </p:blipFill>
-              <p:spPr>
-                <a:xfrm>
-                  <a:off x="24992780" y="16304329"/>
-                  <a:ext cx="4178110" cy="2856244"/>
-                </a:xfrm>
-                <a:prstGeom prst="rect">
-                  <a:avLst/>
-                </a:prstGeom>
-              </p:spPr>
-            </p:pic>
-            <p:pic>
-              <p:nvPicPr>
-                <p:cNvPr id="43" name="Picture 42" descr="A diagram of a graph&#10;&#10;AI-generated content may be incorrect.">
-                  <a:extLst>
-                    <a:ext uri="{FF2B5EF4-FFF2-40B4-BE49-F238E27FC236}">
-                      <a16:creationId xmlns:a16="http://schemas.microsoft.com/office/drawing/2014/main" id="{DB360AA0-0B5E-FE90-9020-D58F907D8862}"/>
-                    </a:ext>
-                  </a:extLst>
-                </p:cNvPr>
-                <p:cNvPicPr>
-                  <a:picLocks noChangeAspect="1"/>
-                </p:cNvPicPr>
-                <p:nvPr/>
-              </p:nvPicPr>
-              <p:blipFill>
-                <a:blip r:embed="rId8"/>
-                <a:stretch>
-                  <a:fillRect/>
-                </a:stretch>
-              </p:blipFill>
-              <p:spPr>
-                <a:xfrm>
-                  <a:off x="20808689" y="16289018"/>
-                  <a:ext cx="4178110" cy="2856245"/>
-                </a:xfrm>
-                <a:prstGeom prst="rect">
-                  <a:avLst/>
-                </a:prstGeom>
-              </p:spPr>
-            </p:pic>
-            <p:sp>
-              <p:nvSpPr>
-                <p:cNvPr id="49" name="TextBox 48">
-                  <a:extLst>
-                    <a:ext uri="{FF2B5EF4-FFF2-40B4-BE49-F238E27FC236}">
-                      <a16:creationId xmlns:a16="http://schemas.microsoft.com/office/drawing/2014/main" id="{2C26822A-2883-068A-A4D7-AE40CC31B7B8}"/>
-                    </a:ext>
-                  </a:extLst>
-                </p:cNvPr>
-                <p:cNvSpPr txBox="1"/>
-                <p:nvPr/>
-              </p:nvSpPr>
-              <p:spPr>
-                <a:xfrm>
-                  <a:off x="21089225" y="16210552"/>
-                  <a:ext cx="390625" cy="461665"/>
-                </a:xfrm>
-                <a:prstGeom prst="rect">
-                  <a:avLst/>
-                </a:prstGeom>
-                <a:noFill/>
-              </p:spPr>
-              <p:txBody>
-                <a:bodyPr wrap="square" rtlCol="0">
-                  <a:spAutoFit/>
-                </a:bodyPr>
-                <a:lstStyle/>
-                <a:p>
-                  <a:r>
-                    <a:rPr lang="en-GB" sz="2400" b="1" noProof="0" dirty="0"/>
-                    <a:t>B</a:t>
-                  </a:r>
-                </a:p>
-              </p:txBody>
-            </p:sp>
-          </p:grpSp>
-          <p:grpSp>
-            <p:nvGrpSpPr>
-              <p:cNvPr id="95" name="Group 94">
-                <a:extLst>
-                  <a:ext uri="{FF2B5EF4-FFF2-40B4-BE49-F238E27FC236}">
-                    <a16:creationId xmlns:a16="http://schemas.microsoft.com/office/drawing/2014/main" id="{02902CA7-24FA-26C7-5829-98876586A2A1}"/>
-                  </a:ext>
-                </a:extLst>
-              </p:cNvPr>
-              <p:cNvGrpSpPr/>
-              <p:nvPr/>
-            </p:nvGrpSpPr>
-            <p:grpSpPr>
-              <a:xfrm>
-                <a:off x="20817268" y="19347627"/>
-                <a:ext cx="8353734" cy="3090242"/>
-                <a:chOff x="20786365" y="21519981"/>
-                <a:chExt cx="8353734" cy="3090242"/>
-              </a:xfrm>
-            </p:grpSpPr>
-            <p:pic>
-              <p:nvPicPr>
-                <p:cNvPr id="67" name="Picture 66" descr="A graph showing the number of patients with a number of patients&#10;&#10;AI-generated content may be incorrect.">
-                  <a:extLst>
-                    <a:ext uri="{FF2B5EF4-FFF2-40B4-BE49-F238E27FC236}">
-                      <a16:creationId xmlns:a16="http://schemas.microsoft.com/office/drawing/2014/main" id="{B4558922-DFFC-EAA8-32BE-694A1B082673}"/>
-                    </a:ext>
-                  </a:extLst>
-                </p:cNvPr>
-                <p:cNvPicPr>
-                  <a:picLocks noChangeAspect="1"/>
-                </p:cNvPicPr>
-                <p:nvPr/>
-              </p:nvPicPr>
-              <p:blipFill>
-                <a:blip r:embed="rId9"/>
-                <a:stretch>
-                  <a:fillRect/>
-                </a:stretch>
-              </p:blipFill>
-              <p:spPr>
-                <a:xfrm>
-                  <a:off x="24970541" y="21557876"/>
-                  <a:ext cx="4169558" cy="3050088"/>
-                </a:xfrm>
-                <a:prstGeom prst="rect">
-                  <a:avLst/>
-                </a:prstGeom>
-              </p:spPr>
-            </p:pic>
-            <p:pic>
-              <p:nvPicPr>
-                <p:cNvPr id="69" name="Picture 68" descr="A graph of a graph showing the number of points&#10;&#10;AI-generated content may be incorrect.">
-                  <a:extLst>
-                    <a:ext uri="{FF2B5EF4-FFF2-40B4-BE49-F238E27FC236}">
-                      <a16:creationId xmlns:a16="http://schemas.microsoft.com/office/drawing/2014/main" id="{306D3F55-1C56-E5D3-1A9A-10810D3E178E}"/>
-                    </a:ext>
-                  </a:extLst>
-                </p:cNvPr>
-                <p:cNvPicPr>
-                  <a:picLocks noChangeAspect="1"/>
-                </p:cNvPicPr>
-                <p:nvPr/>
-              </p:nvPicPr>
-              <p:blipFill>
-                <a:blip r:embed="rId10"/>
-                <a:stretch>
-                  <a:fillRect/>
-                </a:stretch>
-              </p:blipFill>
-              <p:spPr>
-                <a:xfrm>
-                  <a:off x="20786365" y="21553879"/>
-                  <a:ext cx="4178110" cy="3056344"/>
-                </a:xfrm>
-                <a:prstGeom prst="rect">
-                  <a:avLst/>
-                </a:prstGeom>
-              </p:spPr>
-            </p:pic>
-            <p:sp>
-              <p:nvSpPr>
-                <p:cNvPr id="57" name="TextBox 56">
-                  <a:extLst>
-                    <a:ext uri="{FF2B5EF4-FFF2-40B4-BE49-F238E27FC236}">
-                      <a16:creationId xmlns:a16="http://schemas.microsoft.com/office/drawing/2014/main" id="{D121B5EA-5406-8016-BD1A-F298029CF421}"/>
-                    </a:ext>
-                  </a:extLst>
-                </p:cNvPr>
-                <p:cNvSpPr txBox="1"/>
-                <p:nvPr/>
-              </p:nvSpPr>
-              <p:spPr>
-                <a:xfrm>
-                  <a:off x="21058321" y="21519981"/>
-                  <a:ext cx="390625" cy="461665"/>
-                </a:xfrm>
-                <a:prstGeom prst="rect">
-                  <a:avLst/>
-                </a:prstGeom>
-                <a:noFill/>
-              </p:spPr>
-              <p:txBody>
-                <a:bodyPr wrap="square" rtlCol="0">
-                  <a:spAutoFit/>
-                </a:bodyPr>
-                <a:lstStyle/>
-                <a:p>
-                  <a:r>
-                    <a:rPr lang="en-GB" sz="2400" b="1" noProof="0" dirty="0"/>
-                    <a:t>D</a:t>
-                  </a:r>
-                </a:p>
-              </p:txBody>
-            </p:sp>
-          </p:grpSp>
-          <p:grpSp>
-            <p:nvGrpSpPr>
-              <p:cNvPr id="94" name="Group 93">
-                <a:extLst>
-                  <a:ext uri="{FF2B5EF4-FFF2-40B4-BE49-F238E27FC236}">
-                    <a16:creationId xmlns:a16="http://schemas.microsoft.com/office/drawing/2014/main" id="{BC7B9367-C12B-51C6-5490-0614D5FCA4D8}"/>
-                  </a:ext>
-                </a:extLst>
-              </p:cNvPr>
-              <p:cNvGrpSpPr/>
-              <p:nvPr/>
-            </p:nvGrpSpPr>
-            <p:grpSpPr>
-              <a:xfrm>
-                <a:off x="12014188" y="19347627"/>
-                <a:ext cx="8367070" cy="3094463"/>
-                <a:chOff x="12436207" y="21515761"/>
-                <a:chExt cx="8367070" cy="3094463"/>
-              </a:xfrm>
-            </p:grpSpPr>
-            <p:pic>
-              <p:nvPicPr>
-                <p:cNvPr id="66" name="Picture 65" descr="A graph of a line graph&#10;&#10;AI-generated content may be incorrect.">
-                  <a:extLst>
-                    <a:ext uri="{FF2B5EF4-FFF2-40B4-BE49-F238E27FC236}">
-                      <a16:creationId xmlns:a16="http://schemas.microsoft.com/office/drawing/2014/main" id="{117D43BB-88D9-7284-1863-1B683C97FA65}"/>
-                    </a:ext>
-                  </a:extLst>
-                </p:cNvPr>
-                <p:cNvPicPr>
-                  <a:picLocks noChangeAspect="1"/>
-                </p:cNvPicPr>
-                <p:nvPr/>
-              </p:nvPicPr>
-              <p:blipFill>
-                <a:blip r:embed="rId11"/>
-                <a:stretch>
-                  <a:fillRect/>
-                </a:stretch>
-              </p:blipFill>
-              <p:spPr>
-                <a:xfrm>
-                  <a:off x="12436207" y="21551620"/>
-                  <a:ext cx="4178110" cy="3056344"/>
-                </a:xfrm>
-                <a:prstGeom prst="rect">
-                  <a:avLst/>
-                </a:prstGeom>
-              </p:spPr>
-            </p:pic>
-            <p:pic>
-              <p:nvPicPr>
-                <p:cNvPr id="68" name="Picture 67" descr="A graph of a line graph&#10;&#10;AI-generated content may be incorrect.">
-                  <a:extLst>
-                    <a:ext uri="{FF2B5EF4-FFF2-40B4-BE49-F238E27FC236}">
-                      <a16:creationId xmlns:a16="http://schemas.microsoft.com/office/drawing/2014/main" id="{636DDF9B-F8EE-67F6-735D-E21EFECADDBB}"/>
-                    </a:ext>
-                  </a:extLst>
-                </p:cNvPr>
-                <p:cNvPicPr>
-                  <a:picLocks noChangeAspect="1"/>
-                </p:cNvPicPr>
-                <p:nvPr/>
-              </p:nvPicPr>
-              <p:blipFill>
-                <a:blip r:embed="rId12"/>
-                <a:stretch>
-                  <a:fillRect/>
-                </a:stretch>
-              </p:blipFill>
-              <p:spPr>
-                <a:xfrm>
-                  <a:off x="16625168" y="21553879"/>
-                  <a:ext cx="4178109" cy="3056345"/>
-                </a:xfrm>
-                <a:prstGeom prst="rect">
-                  <a:avLst/>
-                </a:prstGeom>
-              </p:spPr>
-            </p:pic>
-            <p:sp>
-              <p:nvSpPr>
-                <p:cNvPr id="59" name="TextBox 58">
-                  <a:extLst>
-                    <a:ext uri="{FF2B5EF4-FFF2-40B4-BE49-F238E27FC236}">
-                      <a16:creationId xmlns:a16="http://schemas.microsoft.com/office/drawing/2014/main" id="{360FAC35-F7CC-B37C-AFFF-DBA70F68B1B7}"/>
-                    </a:ext>
-                  </a:extLst>
-                </p:cNvPr>
-                <p:cNvSpPr txBox="1"/>
-                <p:nvPr/>
-              </p:nvSpPr>
-              <p:spPr>
-                <a:xfrm>
-                  <a:off x="12695772" y="21515761"/>
-                  <a:ext cx="390625" cy="461665"/>
-                </a:xfrm>
-                <a:prstGeom prst="rect">
-                  <a:avLst/>
-                </a:prstGeom>
-                <a:noFill/>
-              </p:spPr>
-              <p:txBody>
-                <a:bodyPr wrap="square" rtlCol="0">
-                  <a:spAutoFit/>
-                </a:bodyPr>
-                <a:lstStyle/>
-                <a:p>
-                  <a:r>
-                    <a:rPr lang="en-GB" sz="2400" b="1" noProof="0" dirty="0"/>
-                    <a:t>C</a:t>
-                  </a:r>
-                </a:p>
-              </p:txBody>
-            </p:sp>
-          </p:grpSp>
-        </p:grpSp>
-      </p:grpSp>
-      <p:grpSp>
-        <p:nvGrpSpPr>
-          <p:cNvPr id="77" name="Group 76">
-            <a:extLst>
-              <a:ext uri="{FF2B5EF4-FFF2-40B4-BE49-F238E27FC236}">
-                <a16:creationId xmlns:a16="http://schemas.microsoft.com/office/drawing/2014/main" id="{B16A092C-1364-780A-AA1E-E53999D3DA43}"/>
-              </a:ext>
-            </a:extLst>
-          </p:cNvPr>
-          <p:cNvGrpSpPr/>
-          <p:nvPr/>
-        </p:nvGrpSpPr>
-        <p:grpSpPr>
-          <a:xfrm>
-            <a:off x="985116" y="38511320"/>
-            <a:ext cx="13893977" cy="3357855"/>
-            <a:chOff x="1377910" y="38191229"/>
-            <a:chExt cx="11026618" cy="2530059"/>
-          </a:xfrm>
-        </p:grpSpPr>
-        <p:pic>
-          <p:nvPicPr>
-            <p:cNvPr id="75" name="Picture 74" descr="A screenshot of a computer code&#10;&#10;AI-generated content may be incorrect.">
-              <a:extLst>
-                <a:ext uri="{FF2B5EF4-FFF2-40B4-BE49-F238E27FC236}">
-                  <a16:creationId xmlns:a16="http://schemas.microsoft.com/office/drawing/2014/main" id="{96FA7E16-2CCA-8527-B731-E075F69E0922}"/>
-                </a:ext>
-              </a:extLst>
-            </p:cNvPr>
-            <p:cNvPicPr>
-              <a:picLocks noChangeAspect="1"/>
-            </p:cNvPicPr>
-            <p:nvPr/>
-          </p:nvPicPr>
-          <p:blipFill>
-            <a:blip r:embed="rId13"/>
-            <a:stretch>
-              <a:fillRect/>
-            </a:stretch>
-          </p:blipFill>
-          <p:spPr>
-            <a:xfrm>
-              <a:off x="6635688" y="38206469"/>
-              <a:ext cx="5768840" cy="2499577"/>
-            </a:xfrm>
-            <a:prstGeom prst="rect">
-              <a:avLst/>
-            </a:prstGeom>
-          </p:spPr>
-        </p:pic>
-        <p:pic>
-          <p:nvPicPr>
-            <p:cNvPr id="76" name="Picture 75" descr="A screenshot of a computer code&#10;&#10;AI-generated content may be incorrect.">
-              <a:extLst>
-                <a:ext uri="{FF2B5EF4-FFF2-40B4-BE49-F238E27FC236}">
-                  <a16:creationId xmlns:a16="http://schemas.microsoft.com/office/drawing/2014/main" id="{16ACC121-8DE5-B42E-8F65-27BBE296D00F}"/>
-                </a:ext>
-              </a:extLst>
-            </p:cNvPr>
-            <p:cNvPicPr>
-              <a:picLocks noChangeAspect="1"/>
-            </p:cNvPicPr>
-            <p:nvPr/>
-          </p:nvPicPr>
-          <p:blipFill>
-            <a:blip r:embed="rId14"/>
-            <a:stretch>
-              <a:fillRect/>
-            </a:stretch>
-          </p:blipFill>
-          <p:spPr>
-            <a:xfrm>
-              <a:off x="1377910" y="38191229"/>
-              <a:ext cx="5067739" cy="2530059"/>
-            </a:xfrm>
-            <a:prstGeom prst="rect">
-              <a:avLst/>
-            </a:prstGeom>
-          </p:spPr>
-        </p:pic>
-      </p:grpSp>
       <p:grpSp>
         <p:nvGrpSpPr>
           <p:cNvPr id="102" name="Group 101">
@@ -6127,7 +5236,7 @@
                 <p:nvPr/>
               </p:nvPicPr>
               <p:blipFill>
-                <a:blip r:embed="rId15"/>
+                <a:blip r:embed="rId5"/>
                 <a:stretch>
                   <a:fillRect/>
                 </a:stretch>
@@ -6157,7 +5266,7 @@
                 <p:nvPr/>
               </p:nvPicPr>
               <p:blipFill>
-                <a:blip r:embed="rId16"/>
+                <a:blip r:embed="rId6"/>
                 <a:stretch>
                   <a:fillRect/>
                 </a:stretch>
@@ -6432,528 +5541,6 @@
               <a:t>.</a:t>
             </a:r>
             <a:endParaRPr lang="en-GB" b="1" dirty="0"/>
-          </a:p>
-        </p:txBody>
-      </p:sp>
-      <p:grpSp>
-        <p:nvGrpSpPr>
-          <p:cNvPr id="17" name="Group 16">
-            <a:extLst>
-              <a:ext uri="{FF2B5EF4-FFF2-40B4-BE49-F238E27FC236}">
-                <a16:creationId xmlns:a16="http://schemas.microsoft.com/office/drawing/2014/main" id="{8E5482DE-AEF0-1228-26AC-5DB54DB02E27}"/>
-              </a:ext>
-            </a:extLst>
-          </p:cNvPr>
-          <p:cNvGrpSpPr/>
-          <p:nvPr/>
-        </p:nvGrpSpPr>
-        <p:grpSpPr>
-          <a:xfrm>
-            <a:off x="851766" y="29654145"/>
-            <a:ext cx="14159634" cy="8554153"/>
-            <a:chOff x="851766" y="29318865"/>
-            <a:chExt cx="14159634" cy="8554153"/>
-          </a:xfrm>
-        </p:grpSpPr>
-        <p:grpSp>
-          <p:nvGrpSpPr>
-            <p:cNvPr id="91" name="Group 90">
-              <a:extLst>
-                <a:ext uri="{FF2B5EF4-FFF2-40B4-BE49-F238E27FC236}">
-                  <a16:creationId xmlns:a16="http://schemas.microsoft.com/office/drawing/2014/main" id="{166F40FE-C925-3ACA-6254-644E38B9C757}"/>
-                </a:ext>
-              </a:extLst>
-            </p:cNvPr>
-            <p:cNvGrpSpPr/>
-            <p:nvPr/>
-          </p:nvGrpSpPr>
-          <p:grpSpPr>
-            <a:xfrm>
-              <a:off x="851766" y="29318865"/>
-              <a:ext cx="14159634" cy="7969168"/>
-              <a:chOff x="851766" y="29318865"/>
-              <a:chExt cx="14159634" cy="7969168"/>
-            </a:xfrm>
-          </p:grpSpPr>
-          <p:grpSp>
-            <p:nvGrpSpPr>
-              <p:cNvPr id="79" name="Group 78">
-                <a:extLst>
-                  <a:ext uri="{FF2B5EF4-FFF2-40B4-BE49-F238E27FC236}">
-                    <a16:creationId xmlns:a16="http://schemas.microsoft.com/office/drawing/2014/main" id="{87982164-A01E-8CDD-4294-008F8D3C4391}"/>
-                  </a:ext>
-                </a:extLst>
-              </p:cNvPr>
-              <p:cNvGrpSpPr/>
-              <p:nvPr/>
-            </p:nvGrpSpPr>
-            <p:grpSpPr>
-              <a:xfrm>
-                <a:off x="851766" y="29318865"/>
-                <a:ext cx="14159634" cy="7969168"/>
-                <a:chOff x="851766" y="29318865"/>
-                <a:chExt cx="14159634" cy="7969168"/>
-              </a:xfrm>
-            </p:grpSpPr>
-            <p:grpSp>
-              <p:nvGrpSpPr>
-                <p:cNvPr id="70" name="Group 69">
-                  <a:extLst>
-                    <a:ext uri="{FF2B5EF4-FFF2-40B4-BE49-F238E27FC236}">
-                      <a16:creationId xmlns:a16="http://schemas.microsoft.com/office/drawing/2014/main" id="{C5069539-0B89-E536-6562-793A62356A61}"/>
-                    </a:ext>
-                  </a:extLst>
-                </p:cNvPr>
-                <p:cNvGrpSpPr/>
-                <p:nvPr/>
-              </p:nvGrpSpPr>
-              <p:grpSpPr>
-                <a:xfrm>
-                  <a:off x="851766" y="29664767"/>
-                  <a:ext cx="9603526" cy="7623266"/>
-                  <a:chOff x="6487605" y="34375433"/>
-                  <a:chExt cx="8062777" cy="6047084"/>
-                </a:xfrm>
-              </p:grpSpPr>
-              <p:pic>
-                <p:nvPicPr>
-                  <p:cNvPr id="71" name="Picture 70" descr="A diagram of different colored circles&#10;&#10;AI-generated content may be incorrect.">
-                    <a:extLst>
-                      <a:ext uri="{FF2B5EF4-FFF2-40B4-BE49-F238E27FC236}">
-                        <a16:creationId xmlns:a16="http://schemas.microsoft.com/office/drawing/2014/main" id="{C6460AC3-C218-761B-038B-104C45983826}"/>
-                      </a:ext>
-                    </a:extLst>
-                  </p:cNvPr>
-                  <p:cNvPicPr>
-                    <a:picLocks noChangeAspect="1"/>
-                  </p:cNvPicPr>
-                  <p:nvPr/>
-                </p:nvPicPr>
-                <p:blipFill>
-                  <a:blip r:embed="rId17"/>
-                  <a:stretch>
-                    <a:fillRect/>
-                  </a:stretch>
-                </p:blipFill>
-                <p:spPr>
-                  <a:xfrm>
-                    <a:off x="6519450" y="37398975"/>
-                    <a:ext cx="4031389" cy="3023542"/>
-                  </a:xfrm>
-                  <a:prstGeom prst="rect">
-                    <a:avLst/>
-                  </a:prstGeom>
-                </p:spPr>
-              </p:pic>
-              <p:pic>
-                <p:nvPicPr>
-                  <p:cNvPr id="72" name="Picture 71" descr="A diagram of a diagram showing different colored circles&#10;&#10;AI-generated content may be incorrect.">
-                    <a:extLst>
-                      <a:ext uri="{FF2B5EF4-FFF2-40B4-BE49-F238E27FC236}">
-                        <a16:creationId xmlns:a16="http://schemas.microsoft.com/office/drawing/2014/main" id="{415CD5F1-8F9E-500A-5556-8945870412A9}"/>
-                      </a:ext>
-                    </a:extLst>
-                  </p:cNvPr>
-                  <p:cNvPicPr>
-                    <a:picLocks noChangeAspect="1"/>
-                  </p:cNvPicPr>
-                  <p:nvPr/>
-                </p:nvPicPr>
-                <p:blipFill>
-                  <a:blip r:embed="rId18"/>
-                  <a:stretch>
-                    <a:fillRect/>
-                  </a:stretch>
-                </p:blipFill>
-                <p:spPr>
-                  <a:xfrm>
-                    <a:off x="6487605" y="34375433"/>
-                    <a:ext cx="4031389" cy="3023542"/>
-                  </a:xfrm>
-                  <a:prstGeom prst="rect">
-                    <a:avLst/>
-                  </a:prstGeom>
-                </p:spPr>
-              </p:pic>
-              <p:pic>
-                <p:nvPicPr>
-                  <p:cNvPr id="73" name="Picture 72" descr="A diagram of a graph&#10;&#10;AI-generated content may be incorrect.">
-                    <a:extLst>
-                      <a:ext uri="{FF2B5EF4-FFF2-40B4-BE49-F238E27FC236}">
-                        <a16:creationId xmlns:a16="http://schemas.microsoft.com/office/drawing/2014/main" id="{21C15B5F-B609-118A-C994-3804E4AC667A}"/>
-                      </a:ext>
-                    </a:extLst>
-                  </p:cNvPr>
-                  <p:cNvPicPr>
-                    <a:picLocks noChangeAspect="1"/>
-                  </p:cNvPicPr>
-                  <p:nvPr/>
-                </p:nvPicPr>
-                <p:blipFill>
-                  <a:blip r:embed="rId19"/>
-                  <a:stretch>
-                    <a:fillRect/>
-                  </a:stretch>
-                </p:blipFill>
-                <p:spPr>
-                  <a:xfrm>
-                    <a:off x="10518992" y="37398976"/>
-                    <a:ext cx="4031388" cy="3023541"/>
-                  </a:xfrm>
-                  <a:prstGeom prst="rect">
-                    <a:avLst/>
-                  </a:prstGeom>
-                </p:spPr>
-              </p:pic>
-              <p:pic>
-                <p:nvPicPr>
-                  <p:cNvPr id="74" name="Picture 73" descr="A diagram of different colored circles&#10;&#10;AI-generated content may be incorrect.">
-                    <a:extLst>
-                      <a:ext uri="{FF2B5EF4-FFF2-40B4-BE49-F238E27FC236}">
-                        <a16:creationId xmlns:a16="http://schemas.microsoft.com/office/drawing/2014/main" id="{DDE36B41-C80F-1C08-E5FC-7F95076DC447}"/>
-                      </a:ext>
-                    </a:extLst>
-                  </p:cNvPr>
-                  <p:cNvPicPr>
-                    <a:picLocks noChangeAspect="1"/>
-                  </p:cNvPicPr>
-                  <p:nvPr/>
-                </p:nvPicPr>
-                <p:blipFill>
-                  <a:blip r:embed="rId20"/>
-                  <a:stretch>
-                    <a:fillRect/>
-                  </a:stretch>
-                </p:blipFill>
-                <p:spPr>
-                  <a:xfrm>
-                    <a:off x="10518993" y="34375433"/>
-                    <a:ext cx="4031389" cy="3023542"/>
-                  </a:xfrm>
-                  <a:prstGeom prst="rect">
-                    <a:avLst/>
-                  </a:prstGeom>
-                </p:spPr>
-              </p:pic>
-            </p:grpSp>
-            <p:sp>
-              <p:nvSpPr>
-                <p:cNvPr id="78" name="TextBox 77">
-                  <a:extLst>
-                    <a:ext uri="{FF2B5EF4-FFF2-40B4-BE49-F238E27FC236}">
-                      <a16:creationId xmlns:a16="http://schemas.microsoft.com/office/drawing/2014/main" id="{9C8CE86A-7B36-57C3-3567-E9BD5C58EE29}"/>
-                    </a:ext>
-                  </a:extLst>
-                </p:cNvPr>
-                <p:cNvSpPr txBox="1"/>
-                <p:nvPr/>
-              </p:nvSpPr>
-              <p:spPr>
-                <a:xfrm>
-                  <a:off x="10475862" y="29318865"/>
-                  <a:ext cx="4535538" cy="3785652"/>
-                </a:xfrm>
-                <a:prstGeom prst="rect">
-                  <a:avLst/>
-                </a:prstGeom>
-                <a:noFill/>
-              </p:spPr>
-              <p:txBody>
-                <a:bodyPr wrap="square" rtlCol="0">
-                  <a:spAutoFit/>
-                </a:bodyPr>
-                <a:lstStyle/>
-                <a:p>
-                  <a:r>
-                    <a:rPr lang="en-GB" sz="2000" b="1" noProof="0" dirty="0"/>
-                    <a:t>Fig. 6 </a:t>
-                  </a:r>
-                  <a:r>
-                    <a:rPr lang="en-GB" sz="2000" noProof="0" dirty="0" err="1"/>
-                    <a:t>kmeans</a:t>
-                  </a:r>
-                  <a:r>
-                    <a:rPr lang="en-GB" sz="2000" noProof="0" dirty="0"/>
-                    <a:t> clustering of the selected and not-selected proteins</a:t>
-                  </a:r>
-                </a:p>
-                <a:p>
-                  <a:endParaRPr lang="en-GB" sz="2000" dirty="0"/>
-                </a:p>
-                <a:p>
-                  <a:r>
-                    <a:rPr lang="en-GB" sz="2000" b="1" noProof="0" dirty="0"/>
-                    <a:t>A) </a:t>
-                  </a:r>
-                  <a:r>
-                    <a:rPr lang="en-GB" sz="2000" noProof="0" dirty="0"/>
-                    <a:t>Shows the 3 clusters of the CTRL of the selected proteins. </a:t>
-                  </a:r>
-                  <a:r>
-                    <a:rPr lang="en-GB" sz="2000" b="1" noProof="0" dirty="0"/>
-                    <a:t>B</a:t>
-                  </a:r>
-                  <a:r>
-                    <a:rPr lang="en-GB" sz="2000" b="1" dirty="0"/>
-                    <a:t>) </a:t>
-                  </a:r>
-                  <a:r>
-                    <a:rPr lang="en-GB" sz="2000" dirty="0"/>
-                    <a:t>Shows the 3 clusters of the RNASE of the selected proteins. A significant shift in form and location of the clusters is noticeable. </a:t>
-                  </a:r>
-                  <a:r>
-                    <a:rPr lang="en-GB" sz="2000" b="1" dirty="0"/>
-                    <a:t>C) </a:t>
-                  </a:r>
-                  <a:r>
-                    <a:rPr lang="en-GB" sz="2000" dirty="0"/>
-                    <a:t>Shows the 3 clusters of the CTRL of the not-selected proteins. </a:t>
-                  </a:r>
-                  <a:r>
-                    <a:rPr lang="en-GB" sz="2000" b="1" dirty="0"/>
-                    <a:t>D) </a:t>
-                  </a:r>
-                  <a:r>
-                    <a:rPr lang="en-GB" sz="2000" dirty="0"/>
-                    <a:t>Shows the 3 clusters of the RNASE of the not-selected proteins. No shift in form and location is noticeable.</a:t>
-                  </a:r>
-                  <a:endParaRPr lang="en-GB" sz="2000" noProof="0" dirty="0"/>
-                </a:p>
-              </p:txBody>
-            </p:sp>
-          </p:grpSp>
-          <p:sp>
-            <p:nvSpPr>
-              <p:cNvPr id="87" name="TextBox 86">
-                <a:extLst>
-                  <a:ext uri="{FF2B5EF4-FFF2-40B4-BE49-F238E27FC236}">
-                    <a16:creationId xmlns:a16="http://schemas.microsoft.com/office/drawing/2014/main" id="{62897110-4AAA-BEA4-F290-D044A5F6BACE}"/>
-                  </a:ext>
-                </a:extLst>
-              </p:cNvPr>
-              <p:cNvSpPr txBox="1"/>
-              <p:nvPr/>
-            </p:nvSpPr>
-            <p:spPr>
-              <a:xfrm>
-                <a:off x="889695" y="29318865"/>
-                <a:ext cx="678461" cy="461665"/>
-              </a:xfrm>
-              <a:prstGeom prst="rect">
-                <a:avLst/>
-              </a:prstGeom>
-              <a:noFill/>
-            </p:spPr>
-            <p:txBody>
-              <a:bodyPr wrap="square" rtlCol="0">
-                <a:spAutoFit/>
-              </a:bodyPr>
-              <a:lstStyle/>
-              <a:p>
-                <a:r>
-                  <a:rPr lang="en-GB" sz="2400" b="1" dirty="0"/>
-                  <a:t>6</a:t>
-                </a:r>
-                <a:r>
-                  <a:rPr lang="en-GB" sz="2400" b="1" noProof="0" dirty="0"/>
-                  <a:t>A</a:t>
-                </a:r>
-              </a:p>
-            </p:txBody>
-          </p:sp>
-          <p:sp>
-            <p:nvSpPr>
-              <p:cNvPr id="88" name="TextBox 87">
-                <a:extLst>
-                  <a:ext uri="{FF2B5EF4-FFF2-40B4-BE49-F238E27FC236}">
-                    <a16:creationId xmlns:a16="http://schemas.microsoft.com/office/drawing/2014/main" id="{9CE5C8E3-DFC8-EF90-2AE0-DF17552E161D}"/>
-                  </a:ext>
-                </a:extLst>
-              </p:cNvPr>
-              <p:cNvSpPr txBox="1"/>
-              <p:nvPr/>
-            </p:nvSpPr>
-            <p:spPr>
-              <a:xfrm>
-                <a:off x="5674100" y="29318865"/>
-                <a:ext cx="390625" cy="461665"/>
-              </a:xfrm>
-              <a:prstGeom prst="rect">
-                <a:avLst/>
-              </a:prstGeom>
-              <a:noFill/>
-            </p:spPr>
-            <p:txBody>
-              <a:bodyPr wrap="square" rtlCol="0">
-                <a:spAutoFit/>
-              </a:bodyPr>
-              <a:lstStyle/>
-              <a:p>
-                <a:r>
-                  <a:rPr lang="en-GB" sz="2400" b="1" noProof="0" dirty="0"/>
-                  <a:t>B</a:t>
-                </a:r>
-              </a:p>
-            </p:txBody>
-          </p:sp>
-          <p:sp>
-            <p:nvSpPr>
-              <p:cNvPr id="89" name="TextBox 88">
-                <a:extLst>
-                  <a:ext uri="{FF2B5EF4-FFF2-40B4-BE49-F238E27FC236}">
-                    <a16:creationId xmlns:a16="http://schemas.microsoft.com/office/drawing/2014/main" id="{066034F3-9635-5E89-5520-4C7728B02937}"/>
-                  </a:ext>
-                </a:extLst>
-              </p:cNvPr>
-              <p:cNvSpPr txBox="1"/>
-              <p:nvPr/>
-            </p:nvSpPr>
-            <p:spPr>
-              <a:xfrm>
-                <a:off x="5691460" y="33146513"/>
-                <a:ext cx="390625" cy="461665"/>
-              </a:xfrm>
-              <a:prstGeom prst="rect">
-                <a:avLst/>
-              </a:prstGeom>
-              <a:noFill/>
-            </p:spPr>
-            <p:txBody>
-              <a:bodyPr wrap="square" rtlCol="0">
-                <a:spAutoFit/>
-              </a:bodyPr>
-              <a:lstStyle/>
-              <a:p>
-                <a:r>
-                  <a:rPr lang="en-GB" sz="2400" b="1" noProof="0" dirty="0"/>
-                  <a:t>D</a:t>
-                </a:r>
-              </a:p>
-            </p:txBody>
-          </p:sp>
-          <p:sp>
-            <p:nvSpPr>
-              <p:cNvPr id="90" name="TextBox 89">
-                <a:extLst>
-                  <a:ext uri="{FF2B5EF4-FFF2-40B4-BE49-F238E27FC236}">
-                    <a16:creationId xmlns:a16="http://schemas.microsoft.com/office/drawing/2014/main" id="{5037DAB0-C266-E539-68CB-472541869189}"/>
-                  </a:ext>
-                </a:extLst>
-              </p:cNvPr>
-              <p:cNvSpPr txBox="1"/>
-              <p:nvPr/>
-            </p:nvSpPr>
-            <p:spPr>
-              <a:xfrm>
-                <a:off x="851766" y="33130498"/>
-                <a:ext cx="390625" cy="461665"/>
-              </a:xfrm>
-              <a:prstGeom prst="rect">
-                <a:avLst/>
-              </a:prstGeom>
-              <a:noFill/>
-            </p:spPr>
-            <p:txBody>
-              <a:bodyPr wrap="square" rtlCol="0">
-                <a:spAutoFit/>
-              </a:bodyPr>
-              <a:lstStyle/>
-              <a:p>
-                <a:r>
-                  <a:rPr lang="en-GB" sz="2400" b="1" noProof="0" dirty="0"/>
-                  <a:t>C</a:t>
-                </a:r>
-              </a:p>
-            </p:txBody>
-          </p:sp>
-        </p:grpSp>
-        <p:sp>
-          <p:nvSpPr>
-            <p:cNvPr id="9" name="TextBox 8">
-              <a:extLst>
-                <a:ext uri="{FF2B5EF4-FFF2-40B4-BE49-F238E27FC236}">
-                  <a16:creationId xmlns:a16="http://schemas.microsoft.com/office/drawing/2014/main" id="{99CE0904-0487-B5AB-DC63-D6DB05F5B994}"/>
-                </a:ext>
-              </a:extLst>
-            </p:cNvPr>
-            <p:cNvSpPr txBox="1"/>
-            <p:nvPr/>
-          </p:nvSpPr>
-          <p:spPr>
-            <a:xfrm>
-              <a:off x="10609843" y="33471813"/>
-              <a:ext cx="4373206" cy="4401205"/>
-            </a:xfrm>
-            <a:prstGeom prst="rect">
-              <a:avLst/>
-            </a:prstGeom>
-            <a:noFill/>
-          </p:spPr>
-          <p:txBody>
-            <a:bodyPr wrap="square" rtlCol="0">
-              <a:spAutoFit/>
-            </a:bodyPr>
-            <a:lstStyle/>
-            <a:p>
-              <a:r>
-                <a:rPr lang="en-US" sz="2000" b="1" dirty="0"/>
-                <a:t>Fig. 7 </a:t>
-              </a:r>
-              <a:r>
-                <a:rPr lang="en-US" sz="2000" dirty="0"/>
-                <a:t>Linear regression analyses between the selected proteins and the not-selected proteins each, with global maxima of the selected CTRL proteins as target variable</a:t>
-              </a:r>
-            </a:p>
-            <a:p>
-              <a:endParaRPr lang="en-US" sz="2000" dirty="0"/>
-            </a:p>
-            <a:p>
-              <a:r>
-                <a:rPr lang="en-US" sz="2000" b="1" dirty="0"/>
-                <a:t>A) </a:t>
-              </a:r>
-              <a:r>
-                <a:rPr lang="en-US" sz="2000" dirty="0"/>
-                <a:t>The left regression analysis for the selected proteins describes the target variable well, the right analysis of the not-selected proteins does not. This proves, that there is a difference between the selected and not-selected proteins, and therefore, that the selection criteria worked.</a:t>
-              </a:r>
-              <a:endParaRPr lang="de-DE" sz="2000" dirty="0"/>
-            </a:p>
-          </p:txBody>
-        </p:sp>
-      </p:grpSp>
-      <p:sp>
-        <p:nvSpPr>
-          <p:cNvPr id="11" name="TextBox 10">
-            <a:extLst>
-              <a:ext uri="{FF2B5EF4-FFF2-40B4-BE49-F238E27FC236}">
-                <a16:creationId xmlns:a16="http://schemas.microsoft.com/office/drawing/2014/main" id="{8BF4F80D-1676-544E-67B7-7846FEFB13FC}"/>
-              </a:ext>
-            </a:extLst>
-          </p:cNvPr>
-          <p:cNvSpPr txBox="1"/>
-          <p:nvPr/>
-        </p:nvSpPr>
-        <p:spPr>
-          <a:xfrm>
-            <a:off x="889695" y="38087755"/>
-            <a:ext cx="539898" cy="461665"/>
-          </a:xfrm>
-          <a:prstGeom prst="rect">
-            <a:avLst/>
-          </a:prstGeom>
-          <a:noFill/>
-        </p:spPr>
-        <p:txBody>
-          <a:bodyPr wrap="square" rtlCol="0">
-            <a:spAutoFit/>
-          </a:bodyPr>
-          <a:lstStyle/>
-          <a:p>
-            <a:r>
-              <a:rPr lang="en-GB" sz="2400" b="1" dirty="0"/>
-              <a:t>7A</a:t>
-            </a:r>
-            <a:endParaRPr lang="en-GB" sz="2400" b="1" noProof="0" dirty="0"/>
           </a:p>
         </p:txBody>
       </p:sp>
@@ -7493,7 +6080,7 @@
           <p:nvPr/>
         </p:nvPicPr>
         <p:blipFill>
-          <a:blip r:embed="rId21"/>
+          <a:blip r:embed="rId7"/>
           <a:srcRect l="15812" t="14850" r="9096" b="8618"/>
           <a:stretch>
             <a:fillRect/>
@@ -7524,7 +6111,7 @@
           <p:nvPr/>
         </p:nvPicPr>
         <p:blipFill>
-          <a:blip r:embed="rId22"/>
+          <a:blip r:embed="rId8"/>
           <a:srcRect l="15812" t="14454" r="9096" b="9014"/>
           <a:stretch>
             <a:fillRect/>
@@ -7555,7 +6142,7 @@
           <p:nvPr/>
         </p:nvPicPr>
         <p:blipFill>
-          <a:blip r:embed="rId23"/>
+          <a:blip r:embed="rId9"/>
           <a:srcRect l="19350" t="12381" r="13613" b="8617"/>
           <a:stretch>
             <a:fillRect/>
@@ -7571,6 +6158,1151 @@
           </a:prstGeom>
         </p:spPr>
       </p:pic>
+      <p:grpSp>
+        <p:nvGrpSpPr>
+          <p:cNvPr id="111" name="Group 110">
+            <a:extLst>
+              <a:ext uri="{FF2B5EF4-FFF2-40B4-BE49-F238E27FC236}">
+                <a16:creationId xmlns:a16="http://schemas.microsoft.com/office/drawing/2014/main" id="{4437C7D7-3CE4-FBD7-E50F-136C4D46CBB5}"/>
+              </a:ext>
+            </a:extLst>
+          </p:cNvPr>
+          <p:cNvGrpSpPr/>
+          <p:nvPr/>
+        </p:nvGrpSpPr>
+        <p:grpSpPr>
+          <a:xfrm>
+            <a:off x="17054511" y="18420581"/>
+            <a:ext cx="12220033" cy="8173137"/>
+            <a:chOff x="13153850" y="15954131"/>
+            <a:chExt cx="12220033" cy="8173137"/>
+          </a:xfrm>
+        </p:grpSpPr>
+        <p:grpSp>
+          <p:nvGrpSpPr>
+            <p:cNvPr id="110" name="Group 109">
+              <a:extLst>
+                <a:ext uri="{FF2B5EF4-FFF2-40B4-BE49-F238E27FC236}">
+                  <a16:creationId xmlns:a16="http://schemas.microsoft.com/office/drawing/2014/main" id="{C0C63AC4-C4BF-FD0E-C6BC-1B7D7EB3ECD3}"/>
+                </a:ext>
+              </a:extLst>
+            </p:cNvPr>
+            <p:cNvGrpSpPr/>
+            <p:nvPr/>
+          </p:nvGrpSpPr>
+          <p:grpSpPr>
+            <a:xfrm>
+              <a:off x="13153850" y="15954131"/>
+              <a:ext cx="12220033" cy="5748249"/>
+              <a:chOff x="6343061" y="15742343"/>
+              <a:chExt cx="12220033" cy="5748249"/>
+            </a:xfrm>
+          </p:grpSpPr>
+          <p:grpSp>
+            <p:nvGrpSpPr>
+              <p:cNvPr id="105" name="Group 104">
+                <a:extLst>
+                  <a:ext uri="{FF2B5EF4-FFF2-40B4-BE49-F238E27FC236}">
+                    <a16:creationId xmlns:a16="http://schemas.microsoft.com/office/drawing/2014/main" id="{DEB411BA-167A-EA9C-1855-77B6B5C0FA60}"/>
+                  </a:ext>
+                </a:extLst>
+              </p:cNvPr>
+              <p:cNvGrpSpPr/>
+              <p:nvPr/>
+            </p:nvGrpSpPr>
+            <p:grpSpPr>
+              <a:xfrm>
+                <a:off x="6343061" y="15969640"/>
+                <a:ext cx="12220033" cy="5520952"/>
+                <a:chOff x="6343061" y="15969640"/>
+                <a:chExt cx="12220033" cy="5520952"/>
+              </a:xfrm>
+            </p:grpSpPr>
+            <p:pic>
+              <p:nvPicPr>
+                <p:cNvPr id="53" name="Picture 52" descr="A diagram of a graph&#10;&#10;AI-generated content may be incorrect.">
+                  <a:extLst>
+                    <a:ext uri="{FF2B5EF4-FFF2-40B4-BE49-F238E27FC236}">
+                      <a16:creationId xmlns:a16="http://schemas.microsoft.com/office/drawing/2014/main" id="{BF1FB2BE-E4D2-D316-0353-5407A22DBD48}"/>
+                    </a:ext>
+                  </a:extLst>
+                </p:cNvPr>
+                <p:cNvPicPr>
+                  <a:picLocks noChangeAspect="1"/>
+                </p:cNvPicPr>
+                <p:nvPr/>
+              </p:nvPicPr>
+              <p:blipFill>
+                <a:blip r:embed="rId10"/>
+                <a:stretch>
+                  <a:fillRect/>
+                </a:stretch>
+              </p:blipFill>
+              <p:spPr>
+                <a:xfrm>
+                  <a:off x="6343061" y="15969640"/>
+                  <a:ext cx="3814597" cy="2860948"/>
+                </a:xfrm>
+                <a:prstGeom prst="rect">
+                  <a:avLst/>
+                </a:prstGeom>
+              </p:spPr>
+            </p:pic>
+            <p:pic>
+              <p:nvPicPr>
+                <p:cNvPr id="55" name="Picture 54" descr="A diagram of a graph showing a number of blue dots&#10;&#10;AI-generated content may be incorrect.">
+                  <a:extLst>
+                    <a:ext uri="{FF2B5EF4-FFF2-40B4-BE49-F238E27FC236}">
+                      <a16:creationId xmlns:a16="http://schemas.microsoft.com/office/drawing/2014/main" id="{558A4B50-1728-6895-A500-0D524C724419}"/>
+                    </a:ext>
+                  </a:extLst>
+                </p:cNvPr>
+                <p:cNvPicPr>
+                  <a:picLocks noChangeAspect="1"/>
+                </p:cNvPicPr>
+                <p:nvPr/>
+              </p:nvPicPr>
+              <p:blipFill>
+                <a:blip r:embed="rId11"/>
+                <a:stretch>
+                  <a:fillRect/>
+                </a:stretch>
+              </p:blipFill>
+              <p:spPr>
+                <a:xfrm>
+                  <a:off x="6344438" y="18628600"/>
+                  <a:ext cx="3813219" cy="2859915"/>
+                </a:xfrm>
+                <a:prstGeom prst="rect">
+                  <a:avLst/>
+                </a:prstGeom>
+              </p:spPr>
+            </p:pic>
+            <p:pic>
+              <p:nvPicPr>
+                <p:cNvPr id="58" name="Picture 57" descr="A graph showing a curve of dots&#10;&#10;AI-generated content may be incorrect.">
+                  <a:extLst>
+                    <a:ext uri="{FF2B5EF4-FFF2-40B4-BE49-F238E27FC236}">
+                      <a16:creationId xmlns:a16="http://schemas.microsoft.com/office/drawing/2014/main" id="{BD5429A3-74E1-F4BC-5DC0-FFC1959BBF8D}"/>
+                    </a:ext>
+                  </a:extLst>
+                </p:cNvPr>
+                <p:cNvPicPr>
+                  <a:picLocks noChangeAspect="1"/>
+                </p:cNvPicPr>
+                <p:nvPr/>
+              </p:nvPicPr>
+              <p:blipFill>
+                <a:blip r:embed="rId12"/>
+                <a:stretch>
+                  <a:fillRect/>
+                </a:stretch>
+              </p:blipFill>
+              <p:spPr>
+                <a:xfrm>
+                  <a:off x="10548078" y="15969640"/>
+                  <a:ext cx="3814597" cy="2860948"/>
+                </a:xfrm>
+                <a:prstGeom prst="rect">
+                  <a:avLst/>
+                </a:prstGeom>
+              </p:spPr>
+            </p:pic>
+            <p:pic>
+              <p:nvPicPr>
+                <p:cNvPr id="61" name="Picture 60" descr="A graph showing a curve of a line&#10;&#10;AI-generated content may be incorrect.">
+                  <a:extLst>
+                    <a:ext uri="{FF2B5EF4-FFF2-40B4-BE49-F238E27FC236}">
+                      <a16:creationId xmlns:a16="http://schemas.microsoft.com/office/drawing/2014/main" id="{393CD0A7-033F-D651-4958-ACFADD58346D}"/>
+                    </a:ext>
+                  </a:extLst>
+                </p:cNvPr>
+                <p:cNvPicPr>
+                  <a:picLocks noChangeAspect="1"/>
+                </p:cNvPicPr>
+                <p:nvPr/>
+              </p:nvPicPr>
+              <p:blipFill>
+                <a:blip r:embed="rId13"/>
+                <a:stretch>
+                  <a:fillRect/>
+                </a:stretch>
+              </p:blipFill>
+              <p:spPr>
+                <a:xfrm>
+                  <a:off x="10550376" y="18628682"/>
+                  <a:ext cx="3810000" cy="2857500"/>
+                </a:xfrm>
+                <a:prstGeom prst="rect">
+                  <a:avLst/>
+                </a:prstGeom>
+              </p:spPr>
+            </p:pic>
+            <p:pic>
+              <p:nvPicPr>
+                <p:cNvPr id="86" name="Picture 85" descr="A graph of a patient's elbow&#10;&#10;AI-generated content may be incorrect.">
+                  <a:extLst>
+                    <a:ext uri="{FF2B5EF4-FFF2-40B4-BE49-F238E27FC236}">
+                      <a16:creationId xmlns:a16="http://schemas.microsoft.com/office/drawing/2014/main" id="{CD15D0BD-C6F0-F06D-A260-EBBA1259ACCA}"/>
+                    </a:ext>
+                  </a:extLst>
+                </p:cNvPr>
+                <p:cNvPicPr>
+                  <a:picLocks noChangeAspect="1"/>
+                </p:cNvPicPr>
+                <p:nvPr/>
+              </p:nvPicPr>
+              <p:blipFill>
+                <a:blip r:embed="rId14"/>
+                <a:stretch>
+                  <a:fillRect/>
+                </a:stretch>
+              </p:blipFill>
+              <p:spPr>
+                <a:xfrm>
+                  <a:off x="14753094" y="15969640"/>
+                  <a:ext cx="3810000" cy="2857500"/>
+                </a:xfrm>
+                <a:prstGeom prst="rect">
+                  <a:avLst/>
+                </a:prstGeom>
+              </p:spPr>
+            </p:pic>
+            <p:pic>
+              <p:nvPicPr>
+                <p:cNvPr id="104" name="Picture 103" descr="A graph of a line graph&#10;&#10;AI-generated content may be incorrect.">
+                  <a:extLst>
+                    <a:ext uri="{FF2B5EF4-FFF2-40B4-BE49-F238E27FC236}">
+                      <a16:creationId xmlns:a16="http://schemas.microsoft.com/office/drawing/2014/main" id="{FFBA8ADA-0ADF-002A-B7DE-91D90CEDB1C0}"/>
+                    </a:ext>
+                  </a:extLst>
+                </p:cNvPr>
+                <p:cNvPicPr>
+                  <a:picLocks noChangeAspect="1"/>
+                </p:cNvPicPr>
+                <p:nvPr/>
+              </p:nvPicPr>
+              <p:blipFill>
+                <a:blip r:embed="rId15"/>
+                <a:stretch>
+                  <a:fillRect/>
+                </a:stretch>
+              </p:blipFill>
+              <p:spPr>
+                <a:xfrm>
+                  <a:off x="14755393" y="18634816"/>
+                  <a:ext cx="3807701" cy="2855776"/>
+                </a:xfrm>
+                <a:prstGeom prst="rect">
+                  <a:avLst/>
+                </a:prstGeom>
+              </p:spPr>
+            </p:pic>
+          </p:grpSp>
+          <p:sp>
+            <p:nvSpPr>
+              <p:cNvPr id="106" name="TextBox 105">
+                <a:extLst>
+                  <a:ext uri="{FF2B5EF4-FFF2-40B4-BE49-F238E27FC236}">
+                    <a16:creationId xmlns:a16="http://schemas.microsoft.com/office/drawing/2014/main" id="{FFBFEBBA-0F74-DA1D-D0F1-065886400CA9}"/>
+                  </a:ext>
+                </a:extLst>
+              </p:cNvPr>
+              <p:cNvSpPr txBox="1"/>
+              <p:nvPr/>
+            </p:nvSpPr>
+            <p:spPr>
+              <a:xfrm>
+                <a:off x="6515900" y="15763772"/>
+                <a:ext cx="558327" cy="461665"/>
+              </a:xfrm>
+              <a:prstGeom prst="rect">
+                <a:avLst/>
+              </a:prstGeom>
+              <a:noFill/>
+            </p:spPr>
+            <p:txBody>
+              <a:bodyPr wrap="square" rtlCol="0">
+                <a:spAutoFit/>
+              </a:bodyPr>
+              <a:lstStyle/>
+              <a:p>
+                <a:r>
+                  <a:rPr lang="en-GB" sz="2400" b="1" noProof="0" dirty="0"/>
+                  <a:t>5A</a:t>
+                </a:r>
+              </a:p>
+            </p:txBody>
+          </p:sp>
+          <p:sp>
+            <p:nvSpPr>
+              <p:cNvPr id="107" name="TextBox 106">
+                <a:extLst>
+                  <a:ext uri="{FF2B5EF4-FFF2-40B4-BE49-F238E27FC236}">
+                    <a16:creationId xmlns:a16="http://schemas.microsoft.com/office/drawing/2014/main" id="{851D7709-9FC9-9400-BDFF-44A8489BB1CC}"/>
+                  </a:ext>
+                </a:extLst>
+              </p:cNvPr>
+              <p:cNvSpPr txBox="1"/>
+              <p:nvPr/>
+            </p:nvSpPr>
+            <p:spPr>
+              <a:xfrm>
+                <a:off x="10856694" y="15742343"/>
+                <a:ext cx="390625" cy="461665"/>
+              </a:xfrm>
+              <a:prstGeom prst="rect">
+                <a:avLst/>
+              </a:prstGeom>
+              <a:noFill/>
+            </p:spPr>
+            <p:txBody>
+              <a:bodyPr wrap="square" rtlCol="0">
+                <a:spAutoFit/>
+              </a:bodyPr>
+              <a:lstStyle/>
+              <a:p>
+                <a:r>
+                  <a:rPr lang="en-GB" sz="2400" b="1" noProof="0" dirty="0"/>
+                  <a:t>B</a:t>
+                </a:r>
+              </a:p>
+            </p:txBody>
+          </p:sp>
+          <p:sp>
+            <p:nvSpPr>
+              <p:cNvPr id="108" name="TextBox 107">
+                <a:extLst>
+                  <a:ext uri="{FF2B5EF4-FFF2-40B4-BE49-F238E27FC236}">
+                    <a16:creationId xmlns:a16="http://schemas.microsoft.com/office/drawing/2014/main" id="{2C1BEABB-319E-A2E5-1EB2-0A4BCA8A9948}"/>
+                  </a:ext>
+                </a:extLst>
+              </p:cNvPr>
+              <p:cNvSpPr txBox="1"/>
+              <p:nvPr/>
+            </p:nvSpPr>
+            <p:spPr>
+              <a:xfrm>
+                <a:off x="14993991" y="15763772"/>
+                <a:ext cx="390625" cy="461665"/>
+              </a:xfrm>
+              <a:prstGeom prst="rect">
+                <a:avLst/>
+              </a:prstGeom>
+              <a:noFill/>
+            </p:spPr>
+            <p:txBody>
+              <a:bodyPr wrap="square" rtlCol="0">
+                <a:spAutoFit/>
+              </a:bodyPr>
+              <a:lstStyle/>
+              <a:p>
+                <a:r>
+                  <a:rPr lang="en-GB" sz="2400" b="1" noProof="0" dirty="0"/>
+                  <a:t>C</a:t>
+                </a:r>
+              </a:p>
+            </p:txBody>
+          </p:sp>
+        </p:grpSp>
+        <p:sp>
+          <p:nvSpPr>
+            <p:cNvPr id="109" name="TextBox 108">
+              <a:extLst>
+                <a:ext uri="{FF2B5EF4-FFF2-40B4-BE49-F238E27FC236}">
+                  <a16:creationId xmlns:a16="http://schemas.microsoft.com/office/drawing/2014/main" id="{9D8FEEE0-5551-B827-0B8E-453E42DD945C}"/>
+                </a:ext>
+              </a:extLst>
+            </p:cNvPr>
+            <p:cNvSpPr txBox="1"/>
+            <p:nvPr/>
+          </p:nvSpPr>
+          <p:spPr>
+            <a:xfrm>
+              <a:off x="13158471" y="21880499"/>
+              <a:ext cx="12215412" cy="2246769"/>
+            </a:xfrm>
+            <a:prstGeom prst="rect">
+              <a:avLst/>
+            </a:prstGeom>
+            <a:noFill/>
+          </p:spPr>
+          <p:txBody>
+            <a:bodyPr wrap="square" rtlCol="0">
+              <a:spAutoFit/>
+            </a:bodyPr>
+            <a:lstStyle/>
+            <a:p>
+              <a:pPr algn="just"/>
+              <a:r>
+                <a:rPr lang="en-GB" sz="2000" b="1" noProof="0" dirty="0"/>
+                <a:t>Fig. 5 </a:t>
+              </a:r>
+              <a:r>
+                <a:rPr lang="en-GB" sz="2000" noProof="0" dirty="0"/>
+                <a:t>Principle Component Analyses and </a:t>
+              </a:r>
+              <a:r>
+                <a:rPr lang="en-GB" sz="2000" noProof="0" dirty="0" err="1"/>
+                <a:t>Elbowplots</a:t>
+              </a:r>
+              <a:r>
+                <a:rPr lang="en-GB" sz="2000" noProof="0" dirty="0"/>
+                <a:t> of the selected and the non-selected proteins. RNASE and CTRL are plotted separately for comparison</a:t>
+              </a:r>
+              <a:r>
+                <a:rPr lang="en-GB" sz="2000" dirty="0"/>
+                <a:t> in the PCA</a:t>
+              </a:r>
+              <a:r>
+                <a:rPr lang="en-GB" sz="2000" noProof="0" dirty="0"/>
+                <a:t>. The </a:t>
+              </a:r>
+              <a:r>
+                <a:rPr lang="en-GB" sz="2000" noProof="0" dirty="0" err="1"/>
+                <a:t>Elbowplots</a:t>
+              </a:r>
+              <a:r>
+                <a:rPr lang="en-GB" sz="2000" noProof="0" dirty="0"/>
+                <a:t> shows only RNASE.</a:t>
+              </a:r>
+            </a:p>
+            <a:p>
+              <a:pPr algn="just"/>
+              <a:endParaRPr lang="en-GB" sz="2000" noProof="0" dirty="0"/>
+            </a:p>
+            <a:p>
+              <a:pPr algn="just"/>
+              <a:r>
+                <a:rPr lang="en-GB" sz="2000" b="1" noProof="0" dirty="0"/>
+                <a:t>A) </a:t>
+              </a:r>
+              <a:r>
+                <a:rPr lang="en-GB" sz="2000" noProof="0" dirty="0"/>
+                <a:t>PCA of the selected proteins. The data points of the RNASE compared to the CTRL </a:t>
+              </a:r>
+              <a:r>
+                <a:rPr lang="en-GB" sz="2000" dirty="0"/>
+                <a:t>make up an overall similar shape</a:t>
+              </a:r>
+              <a:r>
+                <a:rPr lang="en-GB" sz="2000" noProof="0" dirty="0"/>
+                <a:t>, but a shift is visible in the density of the points. </a:t>
+              </a:r>
+              <a:r>
+                <a:rPr lang="en-GB" sz="2000" b="1" noProof="0" dirty="0"/>
+                <a:t>B) </a:t>
+              </a:r>
+              <a:r>
+                <a:rPr lang="en-GB" sz="2000" noProof="0" dirty="0"/>
+                <a:t>PCA</a:t>
+              </a:r>
+              <a:r>
+                <a:rPr lang="en-GB" sz="2000" b="1" noProof="0" dirty="0"/>
+                <a:t> </a:t>
+              </a:r>
+              <a:r>
+                <a:rPr lang="en-GB" sz="2000" noProof="0" dirty="0"/>
+                <a:t>of the non-selected proteins. The points of the RNASE and CTRL form mostly the same structure. </a:t>
+              </a:r>
+              <a:r>
+                <a:rPr lang="en-GB" sz="2000" b="1" noProof="0" dirty="0"/>
+                <a:t>C) </a:t>
+              </a:r>
+              <a:r>
+                <a:rPr lang="en-GB" sz="2000" noProof="0" dirty="0"/>
+                <a:t>Elbow-Plot of the </a:t>
+              </a:r>
+              <a:r>
+                <a:rPr lang="en-GB" sz="2000" dirty="0"/>
+                <a:t>RNASE</a:t>
+              </a:r>
+              <a:r>
+                <a:rPr lang="en-GB" sz="2000" noProof="0" dirty="0"/>
+                <a:t>. The </a:t>
+              </a:r>
+              <a:r>
+                <a:rPr lang="en-GB" sz="2000" dirty="0" err="1"/>
+                <a:t>knick</a:t>
+              </a:r>
+              <a:r>
+                <a:rPr lang="en-GB" sz="2000" noProof="0" dirty="0"/>
+                <a:t> of the elbow is </a:t>
+              </a:r>
+              <a:r>
+                <a:rPr lang="en-GB" sz="2000" dirty="0"/>
+                <a:t>between</a:t>
+              </a:r>
+              <a:r>
+                <a:rPr lang="en-GB" sz="2000" noProof="0" dirty="0"/>
+                <a:t> 3 and 4.</a:t>
+              </a:r>
+              <a:r>
+                <a:rPr lang="en-GB" sz="2000" dirty="0"/>
+                <a:t> To compare selected and non-selected proteins, we decided to use 3 clusters in the </a:t>
+              </a:r>
+              <a:r>
+                <a:rPr lang="en-GB" sz="2000" dirty="0" err="1"/>
+                <a:t>kmeans</a:t>
+              </a:r>
+              <a:r>
+                <a:rPr lang="en-GB" sz="2000" dirty="0"/>
+                <a:t> clustering</a:t>
+              </a:r>
+              <a:r>
+                <a:rPr lang="en-GB" sz="2000" noProof="0" dirty="0"/>
+                <a:t>.</a:t>
+              </a:r>
+            </a:p>
+          </p:txBody>
+        </p:sp>
+      </p:grpSp>
+      <p:grpSp>
+        <p:nvGrpSpPr>
+          <p:cNvPr id="144" name="Group 143">
+            <a:extLst>
+              <a:ext uri="{FF2B5EF4-FFF2-40B4-BE49-F238E27FC236}">
+                <a16:creationId xmlns:a16="http://schemas.microsoft.com/office/drawing/2014/main" id="{EC56D859-B754-2FD8-CF08-4B915B64BCD0}"/>
+              </a:ext>
+            </a:extLst>
+          </p:cNvPr>
+          <p:cNvGrpSpPr/>
+          <p:nvPr/>
+        </p:nvGrpSpPr>
+        <p:grpSpPr>
+          <a:xfrm>
+            <a:off x="796903" y="29608019"/>
+            <a:ext cx="14214497" cy="12149460"/>
+            <a:chOff x="796903" y="29608019"/>
+            <a:chExt cx="14214497" cy="12149460"/>
+          </a:xfrm>
+        </p:grpSpPr>
+        <p:grpSp>
+          <p:nvGrpSpPr>
+            <p:cNvPr id="123" name="Group 122">
+              <a:extLst>
+                <a:ext uri="{FF2B5EF4-FFF2-40B4-BE49-F238E27FC236}">
+                  <a16:creationId xmlns:a16="http://schemas.microsoft.com/office/drawing/2014/main" id="{CBD7C024-F1C7-4BE4-67C5-871D0AC7CAB6}"/>
+                </a:ext>
+              </a:extLst>
+            </p:cNvPr>
+            <p:cNvGrpSpPr/>
+            <p:nvPr/>
+          </p:nvGrpSpPr>
+          <p:grpSpPr>
+            <a:xfrm>
+              <a:off x="796903" y="29608019"/>
+              <a:ext cx="14214497" cy="8790201"/>
+              <a:chOff x="796903" y="29608019"/>
+              <a:chExt cx="14214497" cy="8790201"/>
+            </a:xfrm>
+          </p:grpSpPr>
+          <p:grpSp>
+            <p:nvGrpSpPr>
+              <p:cNvPr id="112" name="Group 111">
+                <a:extLst>
+                  <a:ext uri="{FF2B5EF4-FFF2-40B4-BE49-F238E27FC236}">
+                    <a16:creationId xmlns:a16="http://schemas.microsoft.com/office/drawing/2014/main" id="{C0044A22-73C6-4063-978D-A2160E53106F}"/>
+                  </a:ext>
+                </a:extLst>
+              </p:cNvPr>
+              <p:cNvGrpSpPr/>
+              <p:nvPr/>
+            </p:nvGrpSpPr>
+            <p:grpSpPr>
+              <a:xfrm>
+                <a:off x="796903" y="29608019"/>
+                <a:ext cx="14214497" cy="8790201"/>
+                <a:chOff x="796903" y="29608019"/>
+                <a:chExt cx="14214497" cy="8790201"/>
+              </a:xfrm>
+            </p:grpSpPr>
+            <p:sp>
+              <p:nvSpPr>
+                <p:cNvPr id="78" name="TextBox 77">
+                  <a:extLst>
+                    <a:ext uri="{FF2B5EF4-FFF2-40B4-BE49-F238E27FC236}">
+                      <a16:creationId xmlns:a16="http://schemas.microsoft.com/office/drawing/2014/main" id="{9C8CE86A-7B36-57C3-3567-E9BD5C58EE29}"/>
+                    </a:ext>
+                  </a:extLst>
+                </p:cNvPr>
+                <p:cNvSpPr txBox="1"/>
+                <p:nvPr/>
+              </p:nvSpPr>
+              <p:spPr>
+                <a:xfrm>
+                  <a:off x="10475862" y="29654145"/>
+                  <a:ext cx="4535538" cy="3785652"/>
+                </a:xfrm>
+                <a:prstGeom prst="rect">
+                  <a:avLst/>
+                </a:prstGeom>
+                <a:noFill/>
+              </p:spPr>
+              <p:txBody>
+                <a:bodyPr wrap="square" rtlCol="0">
+                  <a:spAutoFit/>
+                </a:bodyPr>
+                <a:lstStyle/>
+                <a:p>
+                  <a:r>
+                    <a:rPr lang="en-GB" sz="2000" b="1" noProof="0" dirty="0"/>
+                    <a:t>Fig. 6 </a:t>
+                  </a:r>
+                  <a:r>
+                    <a:rPr lang="en-GB" sz="2000" noProof="0" dirty="0" err="1"/>
+                    <a:t>kmeans</a:t>
+                  </a:r>
+                  <a:r>
+                    <a:rPr lang="en-GB" sz="2000" noProof="0" dirty="0"/>
+                    <a:t> clustering of the selected and not-selected proteins</a:t>
+                  </a:r>
+                </a:p>
+                <a:p>
+                  <a:endParaRPr lang="en-GB" sz="2000" dirty="0"/>
+                </a:p>
+                <a:p>
+                  <a:r>
+                    <a:rPr lang="en-GB" sz="2000" b="1" noProof="0" dirty="0"/>
+                    <a:t>A) </a:t>
+                  </a:r>
+                  <a:r>
+                    <a:rPr lang="en-GB" sz="2000" noProof="0" dirty="0"/>
+                    <a:t>Shows the 3 clusters of the CTRL of the selected proteins. </a:t>
+                  </a:r>
+                  <a:r>
+                    <a:rPr lang="en-GB" sz="2000" b="1" noProof="0" dirty="0"/>
+                    <a:t>B</a:t>
+                  </a:r>
+                  <a:r>
+                    <a:rPr lang="en-GB" sz="2000" b="1" dirty="0"/>
+                    <a:t>) </a:t>
+                  </a:r>
+                  <a:r>
+                    <a:rPr lang="en-GB" sz="2000" dirty="0"/>
+                    <a:t>Shows the 3 clusters of the RNASE of the selected proteins. A significant shift in form and location of the clusters is noticeable. </a:t>
+                  </a:r>
+                  <a:r>
+                    <a:rPr lang="en-GB" sz="2000" b="1" dirty="0"/>
+                    <a:t>C) </a:t>
+                  </a:r>
+                  <a:r>
+                    <a:rPr lang="en-GB" sz="2000" dirty="0"/>
+                    <a:t>Shows the 3 clusters of the CTRL of the not-selected proteins. </a:t>
+                  </a:r>
+                  <a:r>
+                    <a:rPr lang="en-GB" sz="2000" b="1" dirty="0"/>
+                    <a:t>D) </a:t>
+                  </a:r>
+                  <a:r>
+                    <a:rPr lang="en-GB" sz="2000" dirty="0"/>
+                    <a:t>Shows the 3 clusters of the RNASE of the not-selected proteins. No shift in form and location is noticeable.</a:t>
+                  </a:r>
+                  <a:endParaRPr lang="en-GB" sz="2000" noProof="0" dirty="0"/>
+                </a:p>
+              </p:txBody>
+            </p:sp>
+            <p:sp>
+              <p:nvSpPr>
+                <p:cNvPr id="87" name="TextBox 86">
+                  <a:extLst>
+                    <a:ext uri="{FF2B5EF4-FFF2-40B4-BE49-F238E27FC236}">
+                      <a16:creationId xmlns:a16="http://schemas.microsoft.com/office/drawing/2014/main" id="{62897110-4AAA-BEA4-F290-D044A5F6BACE}"/>
+                    </a:ext>
+                  </a:extLst>
+                </p:cNvPr>
+                <p:cNvSpPr txBox="1"/>
+                <p:nvPr/>
+              </p:nvSpPr>
+              <p:spPr>
+                <a:xfrm>
+                  <a:off x="796903" y="29665022"/>
+                  <a:ext cx="678461" cy="461665"/>
+                </a:xfrm>
+                <a:prstGeom prst="rect">
+                  <a:avLst/>
+                </a:prstGeom>
+                <a:noFill/>
+              </p:spPr>
+              <p:txBody>
+                <a:bodyPr wrap="square" rtlCol="0">
+                  <a:spAutoFit/>
+                </a:bodyPr>
+                <a:lstStyle/>
+                <a:p>
+                  <a:r>
+                    <a:rPr lang="en-GB" sz="2400" b="1" dirty="0"/>
+                    <a:t>6</a:t>
+                  </a:r>
+                  <a:r>
+                    <a:rPr lang="en-GB" sz="2400" b="1" noProof="0" dirty="0"/>
+                    <a:t>A</a:t>
+                  </a:r>
+                </a:p>
+              </p:txBody>
+            </p:sp>
+            <p:sp>
+              <p:nvSpPr>
+                <p:cNvPr id="88" name="TextBox 87">
+                  <a:extLst>
+                    <a:ext uri="{FF2B5EF4-FFF2-40B4-BE49-F238E27FC236}">
+                      <a16:creationId xmlns:a16="http://schemas.microsoft.com/office/drawing/2014/main" id="{9CE5C8E3-DFC8-EF90-2AE0-DF17552E161D}"/>
+                    </a:ext>
+                  </a:extLst>
+                </p:cNvPr>
+                <p:cNvSpPr txBox="1"/>
+                <p:nvPr/>
+              </p:nvSpPr>
+              <p:spPr>
+                <a:xfrm>
+                  <a:off x="5515397" y="29608019"/>
+                  <a:ext cx="390625" cy="461665"/>
+                </a:xfrm>
+                <a:prstGeom prst="rect">
+                  <a:avLst/>
+                </a:prstGeom>
+                <a:noFill/>
+              </p:spPr>
+              <p:txBody>
+                <a:bodyPr wrap="square" rtlCol="0">
+                  <a:spAutoFit/>
+                </a:bodyPr>
+                <a:lstStyle/>
+                <a:p>
+                  <a:r>
+                    <a:rPr lang="en-GB" sz="2400" b="1" noProof="0" dirty="0"/>
+                    <a:t>B</a:t>
+                  </a:r>
+                </a:p>
+              </p:txBody>
+            </p:sp>
+            <p:sp>
+              <p:nvSpPr>
+                <p:cNvPr id="89" name="TextBox 88">
+                  <a:extLst>
+                    <a:ext uri="{FF2B5EF4-FFF2-40B4-BE49-F238E27FC236}">
+                      <a16:creationId xmlns:a16="http://schemas.microsoft.com/office/drawing/2014/main" id="{066034F3-9635-5E89-5520-4C7728B02937}"/>
+                    </a:ext>
+                  </a:extLst>
+                </p:cNvPr>
+                <p:cNvSpPr txBox="1"/>
+                <p:nvPr/>
+              </p:nvSpPr>
+              <p:spPr>
+                <a:xfrm>
+                  <a:off x="5570782" y="33504624"/>
+                  <a:ext cx="390625" cy="461665"/>
+                </a:xfrm>
+                <a:prstGeom prst="rect">
+                  <a:avLst/>
+                </a:prstGeom>
+                <a:noFill/>
+              </p:spPr>
+              <p:txBody>
+                <a:bodyPr wrap="square" rtlCol="0">
+                  <a:spAutoFit/>
+                </a:bodyPr>
+                <a:lstStyle/>
+                <a:p>
+                  <a:r>
+                    <a:rPr lang="en-GB" sz="2400" b="1" noProof="0" dirty="0"/>
+                    <a:t>D</a:t>
+                  </a:r>
+                </a:p>
+              </p:txBody>
+            </p:sp>
+            <p:sp>
+              <p:nvSpPr>
+                <p:cNvPr id="90" name="TextBox 89">
+                  <a:extLst>
+                    <a:ext uri="{FF2B5EF4-FFF2-40B4-BE49-F238E27FC236}">
+                      <a16:creationId xmlns:a16="http://schemas.microsoft.com/office/drawing/2014/main" id="{5037DAB0-C266-E539-68CB-472541869189}"/>
+                    </a:ext>
+                  </a:extLst>
+                </p:cNvPr>
+                <p:cNvSpPr txBox="1"/>
+                <p:nvPr/>
+              </p:nvSpPr>
+              <p:spPr>
+                <a:xfrm>
+                  <a:off x="926673" y="33511728"/>
+                  <a:ext cx="390625" cy="461665"/>
+                </a:xfrm>
+                <a:prstGeom prst="rect">
+                  <a:avLst/>
+                </a:prstGeom>
+                <a:noFill/>
+              </p:spPr>
+              <p:txBody>
+                <a:bodyPr wrap="square" rtlCol="0">
+                  <a:spAutoFit/>
+                </a:bodyPr>
+                <a:lstStyle/>
+                <a:p>
+                  <a:r>
+                    <a:rPr lang="en-GB" sz="2400" b="1" noProof="0" dirty="0"/>
+                    <a:t>C</a:t>
+                  </a:r>
+                </a:p>
+              </p:txBody>
+            </p:sp>
+            <p:sp>
+              <p:nvSpPr>
+                <p:cNvPr id="9" name="TextBox 8">
+                  <a:extLst>
+                    <a:ext uri="{FF2B5EF4-FFF2-40B4-BE49-F238E27FC236}">
+                      <a16:creationId xmlns:a16="http://schemas.microsoft.com/office/drawing/2014/main" id="{99CE0904-0487-B5AB-DC63-D6DB05F5B994}"/>
+                    </a:ext>
+                  </a:extLst>
+                </p:cNvPr>
+                <p:cNvSpPr txBox="1"/>
+                <p:nvPr/>
+              </p:nvSpPr>
+              <p:spPr>
+                <a:xfrm>
+                  <a:off x="10475862" y="33689239"/>
+                  <a:ext cx="4373206" cy="4708981"/>
+                </a:xfrm>
+                <a:prstGeom prst="rect">
+                  <a:avLst/>
+                </a:prstGeom>
+                <a:noFill/>
+              </p:spPr>
+              <p:txBody>
+                <a:bodyPr wrap="square" rtlCol="0">
+                  <a:spAutoFit/>
+                </a:bodyPr>
+                <a:lstStyle/>
+                <a:p>
+                  <a:r>
+                    <a:rPr lang="en-US" sz="2000" b="1" dirty="0"/>
+                    <a:t>Fig. 7 </a:t>
+                  </a:r>
+                  <a:r>
+                    <a:rPr lang="en-US" sz="2000" dirty="0"/>
+                    <a:t>Linear regression analyses between the selected proteins and the not-selected proteins each, with global maxima of the selected CTRL proteins as target variable</a:t>
+                  </a:r>
+                </a:p>
+                <a:p>
+                  <a:endParaRPr lang="en-US" sz="2000" dirty="0"/>
+                </a:p>
+                <a:p>
+                  <a:r>
+                    <a:rPr lang="en-US" sz="2000" b="1" dirty="0"/>
+                    <a:t>A) </a:t>
+                  </a:r>
+                  <a:r>
+                    <a:rPr lang="en-US" sz="2000" dirty="0"/>
+                    <a:t>The regression analysis for the selected proteins describes the target variable well. </a:t>
+                  </a:r>
+                  <a:r>
+                    <a:rPr lang="en-US" sz="2000" b="1" dirty="0"/>
+                    <a:t>B)</a:t>
+                  </a:r>
+                  <a:r>
+                    <a:rPr lang="en-US" sz="2000" dirty="0"/>
+                    <a:t> The analysis of the not-selected proteins does not describe the target variable well. This proves, that there is a difference between the selected and not-selected proteins, and therefore, that the selection criteria worked.</a:t>
+                  </a:r>
+                  <a:endParaRPr lang="de-DE" sz="2000" dirty="0"/>
+                </a:p>
+              </p:txBody>
+            </p:sp>
+          </p:grpSp>
+          <p:pic>
+            <p:nvPicPr>
+              <p:cNvPr id="114" name="Picture 113" descr="A diagram of different colored circles&#10;&#10;AI-generated content may be incorrect.">
+                <a:extLst>
+                  <a:ext uri="{FF2B5EF4-FFF2-40B4-BE49-F238E27FC236}">
+                    <a16:creationId xmlns:a16="http://schemas.microsoft.com/office/drawing/2014/main" id="{8E28E344-6B53-FEC2-CBDA-0BF24A4C304D}"/>
+                  </a:ext>
+                </a:extLst>
+              </p:cNvPr>
+              <p:cNvPicPr>
+                <a:picLocks noChangeAspect="1"/>
+              </p:cNvPicPr>
+              <p:nvPr/>
+            </p:nvPicPr>
+            <p:blipFill>
+              <a:blip r:embed="rId16"/>
+              <a:stretch>
+                <a:fillRect/>
+              </a:stretch>
+            </p:blipFill>
+            <p:spPr>
+              <a:xfrm>
+                <a:off x="889695" y="30115810"/>
+                <a:ext cx="4642330" cy="3481747"/>
+              </a:xfrm>
+              <a:prstGeom prst="rect">
+                <a:avLst/>
+              </a:prstGeom>
+            </p:spPr>
+          </p:pic>
+          <p:pic>
+            <p:nvPicPr>
+              <p:cNvPr id="118" name="Picture 117" descr="A diagram of different colored circles&#10;&#10;AI-generated content may be incorrect.">
+                <a:extLst>
+                  <a:ext uri="{FF2B5EF4-FFF2-40B4-BE49-F238E27FC236}">
+                    <a16:creationId xmlns:a16="http://schemas.microsoft.com/office/drawing/2014/main" id="{A489A193-1A2E-4FED-EE5C-7CBCED93221C}"/>
+                  </a:ext>
+                </a:extLst>
+              </p:cNvPr>
+              <p:cNvPicPr>
+                <a:picLocks noChangeAspect="1"/>
+              </p:cNvPicPr>
+              <p:nvPr/>
+            </p:nvPicPr>
+            <p:blipFill>
+              <a:blip r:embed="rId17"/>
+              <a:stretch>
+                <a:fillRect/>
+              </a:stretch>
+            </p:blipFill>
+            <p:spPr>
+              <a:xfrm>
+                <a:off x="5532026" y="30115809"/>
+                <a:ext cx="4642330" cy="3481748"/>
+              </a:xfrm>
+              <a:prstGeom prst="rect">
+                <a:avLst/>
+              </a:prstGeom>
+            </p:spPr>
+          </p:pic>
+          <p:pic>
+            <p:nvPicPr>
+              <p:cNvPr id="120" name="Picture 119" descr="A diagram of a graph&#10;&#10;AI-generated content may be incorrect.">
+                <a:extLst>
+                  <a:ext uri="{FF2B5EF4-FFF2-40B4-BE49-F238E27FC236}">
+                    <a16:creationId xmlns:a16="http://schemas.microsoft.com/office/drawing/2014/main" id="{4E2FBCE3-0625-9E9D-571F-9EC0A9E7DED4}"/>
+                  </a:ext>
+                </a:extLst>
+              </p:cNvPr>
+              <p:cNvPicPr>
+                <a:picLocks noChangeAspect="1"/>
+              </p:cNvPicPr>
+              <p:nvPr/>
+            </p:nvPicPr>
+            <p:blipFill>
+              <a:blip r:embed="rId18"/>
+              <a:stretch>
+                <a:fillRect/>
+              </a:stretch>
+            </p:blipFill>
+            <p:spPr>
+              <a:xfrm>
+                <a:off x="5530247" y="33888169"/>
+                <a:ext cx="4642330" cy="3481748"/>
+              </a:xfrm>
+              <a:prstGeom prst="rect">
+                <a:avLst/>
+              </a:prstGeom>
+            </p:spPr>
+          </p:pic>
+          <p:pic>
+            <p:nvPicPr>
+              <p:cNvPr id="122" name="Picture 121" descr="A diagram of a graph&#10;&#10;AI-generated content may be incorrect.">
+                <a:extLst>
+                  <a:ext uri="{FF2B5EF4-FFF2-40B4-BE49-F238E27FC236}">
+                    <a16:creationId xmlns:a16="http://schemas.microsoft.com/office/drawing/2014/main" id="{7E074CF8-C544-BF3F-76EE-BEEDBEEEC52A}"/>
+                  </a:ext>
+                </a:extLst>
+              </p:cNvPr>
+              <p:cNvPicPr>
+                <a:picLocks noChangeAspect="1"/>
+              </p:cNvPicPr>
+              <p:nvPr/>
+            </p:nvPicPr>
+            <p:blipFill>
+              <a:blip r:embed="rId19"/>
+              <a:stretch>
+                <a:fillRect/>
+              </a:stretch>
+            </p:blipFill>
+            <p:spPr>
+              <a:xfrm>
+                <a:off x="889695" y="33890972"/>
+                <a:ext cx="4642331" cy="3481748"/>
+              </a:xfrm>
+              <a:prstGeom prst="rect">
+                <a:avLst/>
+              </a:prstGeom>
+            </p:spPr>
+          </p:pic>
+        </p:grpSp>
+        <p:grpSp>
+          <p:nvGrpSpPr>
+            <p:cNvPr id="142" name="Group 141">
+              <a:extLst>
+                <a:ext uri="{FF2B5EF4-FFF2-40B4-BE49-F238E27FC236}">
+                  <a16:creationId xmlns:a16="http://schemas.microsoft.com/office/drawing/2014/main" id="{A38A2234-2FC1-2730-5414-16F9D955EE90}"/>
+                </a:ext>
+              </a:extLst>
+            </p:cNvPr>
+            <p:cNvGrpSpPr/>
+            <p:nvPr/>
+          </p:nvGrpSpPr>
+          <p:grpSpPr>
+            <a:xfrm>
+              <a:off x="889695" y="38087755"/>
+              <a:ext cx="13876854" cy="3669724"/>
+              <a:chOff x="889695" y="38087755"/>
+              <a:chExt cx="13876854" cy="3669724"/>
+            </a:xfrm>
+          </p:grpSpPr>
+          <p:sp>
+            <p:nvSpPr>
+              <p:cNvPr id="11" name="TextBox 10">
+                <a:extLst>
+                  <a:ext uri="{FF2B5EF4-FFF2-40B4-BE49-F238E27FC236}">
+                    <a16:creationId xmlns:a16="http://schemas.microsoft.com/office/drawing/2014/main" id="{8BF4F80D-1676-544E-67B7-7846FEFB13FC}"/>
+                  </a:ext>
+                </a:extLst>
+              </p:cNvPr>
+              <p:cNvSpPr txBox="1"/>
+              <p:nvPr/>
+            </p:nvSpPr>
+            <p:spPr>
+              <a:xfrm>
+                <a:off x="889695" y="38087755"/>
+                <a:ext cx="539898" cy="461665"/>
+              </a:xfrm>
+              <a:prstGeom prst="rect">
+                <a:avLst/>
+              </a:prstGeom>
+              <a:noFill/>
+            </p:spPr>
+            <p:txBody>
+              <a:bodyPr wrap="square" rtlCol="0">
+                <a:spAutoFit/>
+              </a:bodyPr>
+              <a:lstStyle/>
+              <a:p>
+                <a:r>
+                  <a:rPr lang="en-GB" sz="2400" b="1" dirty="0"/>
+                  <a:t>7A</a:t>
+                </a:r>
+                <a:endParaRPr lang="en-GB" sz="2400" b="1" noProof="0" dirty="0"/>
+              </a:p>
+            </p:txBody>
+          </p:sp>
+          <p:grpSp>
+            <p:nvGrpSpPr>
+              <p:cNvPr id="140" name="Group 139">
+                <a:extLst>
+                  <a:ext uri="{FF2B5EF4-FFF2-40B4-BE49-F238E27FC236}">
+                    <a16:creationId xmlns:a16="http://schemas.microsoft.com/office/drawing/2014/main" id="{C220E857-055B-07D4-F8DB-626CE1C48956}"/>
+                  </a:ext>
+                </a:extLst>
+              </p:cNvPr>
+              <p:cNvGrpSpPr/>
+              <p:nvPr/>
+            </p:nvGrpSpPr>
+            <p:grpSpPr>
+              <a:xfrm>
+                <a:off x="1000669" y="38623828"/>
+                <a:ext cx="13765880" cy="3133651"/>
+                <a:chOff x="1000669" y="38623828"/>
+                <a:chExt cx="13765880" cy="3133651"/>
+              </a:xfrm>
+            </p:grpSpPr>
+            <p:pic>
+              <p:nvPicPr>
+                <p:cNvPr id="137" name="Picture 136">
+                  <a:extLst>
+                    <a:ext uri="{FF2B5EF4-FFF2-40B4-BE49-F238E27FC236}">
+                      <a16:creationId xmlns:a16="http://schemas.microsoft.com/office/drawing/2014/main" id="{2231C775-2055-A106-43DA-29D4B44814DB}"/>
+                    </a:ext>
+                  </a:extLst>
+                </p:cNvPr>
+                <p:cNvPicPr>
+                  <a:picLocks noChangeAspect="1"/>
+                </p:cNvPicPr>
+                <p:nvPr/>
+              </p:nvPicPr>
+              <p:blipFill>
+                <a:blip r:embed="rId20"/>
+                <a:stretch>
+                  <a:fillRect/>
+                </a:stretch>
+              </p:blipFill>
+              <p:spPr>
+                <a:xfrm>
+                  <a:off x="1000669" y="38636308"/>
+                  <a:ext cx="6375970" cy="3121171"/>
+                </a:xfrm>
+                <a:prstGeom prst="rect">
+                  <a:avLst/>
+                </a:prstGeom>
+              </p:spPr>
+            </p:pic>
+            <p:pic>
+              <p:nvPicPr>
+                <p:cNvPr id="139" name="Picture 138">
+                  <a:extLst>
+                    <a:ext uri="{FF2B5EF4-FFF2-40B4-BE49-F238E27FC236}">
+                      <a16:creationId xmlns:a16="http://schemas.microsoft.com/office/drawing/2014/main" id="{4C99E2D5-BC86-241D-A15D-DDDBA045C649}"/>
+                    </a:ext>
+                  </a:extLst>
+                </p:cNvPr>
+                <p:cNvPicPr>
+                  <a:picLocks noChangeAspect="1"/>
+                </p:cNvPicPr>
+                <p:nvPr/>
+              </p:nvPicPr>
+              <p:blipFill>
+                <a:blip r:embed="rId21"/>
+                <a:stretch>
+                  <a:fillRect/>
+                </a:stretch>
+              </p:blipFill>
+              <p:spPr>
+                <a:xfrm>
+                  <a:off x="7569693" y="38623828"/>
+                  <a:ext cx="7196856" cy="3133651"/>
+                </a:xfrm>
+                <a:prstGeom prst="rect">
+                  <a:avLst/>
+                </a:prstGeom>
+              </p:spPr>
+            </p:pic>
+          </p:grpSp>
+          <p:sp>
+            <p:nvSpPr>
+              <p:cNvPr id="141" name="TextBox 140">
+                <a:extLst>
+                  <a:ext uri="{FF2B5EF4-FFF2-40B4-BE49-F238E27FC236}">
+                    <a16:creationId xmlns:a16="http://schemas.microsoft.com/office/drawing/2014/main" id="{EF9387F7-692C-9219-1277-7A719F991B38}"/>
+                  </a:ext>
+                </a:extLst>
+              </p:cNvPr>
+              <p:cNvSpPr txBox="1"/>
+              <p:nvPr/>
+            </p:nvSpPr>
+            <p:spPr>
+              <a:xfrm>
+                <a:off x="7492618" y="38087755"/>
+                <a:ext cx="390625" cy="461665"/>
+              </a:xfrm>
+              <a:prstGeom prst="rect">
+                <a:avLst/>
+              </a:prstGeom>
+              <a:noFill/>
+            </p:spPr>
+            <p:txBody>
+              <a:bodyPr wrap="square" rtlCol="0">
+                <a:spAutoFit/>
+              </a:bodyPr>
+              <a:lstStyle/>
+              <a:p>
+                <a:r>
+                  <a:rPr lang="en-GB" sz="2400" b="1" noProof="0" dirty="0"/>
+                  <a:t>B</a:t>
+                </a:r>
+              </a:p>
+            </p:txBody>
+          </p:sp>
+        </p:grpSp>
+      </p:grpSp>
     </p:spTree>
     <p:extLst>
       <p:ext uri="{BB962C8B-B14F-4D97-AF65-F5344CB8AC3E}">

</xml_diff>

<commit_message>
Repository aufräumen und Poster
</commit_message>
<xml_diff>
--- a/Poster.pptx
+++ b/Poster.pptx
@@ -367,7 +367,7 @@
           <a:p>
             <a:fld id="{C3DFFD0B-8A86-49B4-B585-C3C192A21CEB}" type="slidenum">
               <a:rPr lang="de-DE" smtClean="0"/>
-              <a:t>‹Nr.›</a:t>
+              <a:t>‹#›</a:t>
             </a:fld>
             <a:endParaRPr lang="de-DE"/>
           </a:p>
@@ -757,7 +757,7 @@
           <a:p>
             <a:fld id="{A2ACB64B-D1A6-7D41-9BDE-3BC41FA5B95B}" type="slidenum">
               <a:rPr lang="en-US" smtClean="0"/>
-              <a:t>‹Nr.›</a:t>
+              <a:t>‹#›</a:t>
             </a:fld>
             <a:endParaRPr lang="en-US"/>
           </a:p>
@@ -927,7 +927,7 @@
           <a:p>
             <a:fld id="{A2ACB64B-D1A6-7D41-9BDE-3BC41FA5B95B}" type="slidenum">
               <a:rPr lang="en-US" smtClean="0"/>
-              <a:t>‹Nr.›</a:t>
+              <a:t>‹#›</a:t>
             </a:fld>
             <a:endParaRPr lang="en-US"/>
           </a:p>
@@ -1107,7 +1107,7 @@
           <a:p>
             <a:fld id="{A2ACB64B-D1A6-7D41-9BDE-3BC41FA5B95B}" type="slidenum">
               <a:rPr lang="en-US" smtClean="0"/>
-              <a:t>‹Nr.›</a:t>
+              <a:t>‹#›</a:t>
             </a:fld>
             <a:endParaRPr lang="en-US"/>
           </a:p>
@@ -1277,7 +1277,7 @@
           <a:p>
             <a:fld id="{A2ACB64B-D1A6-7D41-9BDE-3BC41FA5B95B}" type="slidenum">
               <a:rPr lang="en-US" smtClean="0"/>
-              <a:t>‹Nr.›</a:t>
+              <a:t>‹#›</a:t>
             </a:fld>
             <a:endParaRPr lang="en-US"/>
           </a:p>
@@ -1521,7 +1521,7 @@
           <a:p>
             <a:fld id="{A2ACB64B-D1A6-7D41-9BDE-3BC41FA5B95B}" type="slidenum">
               <a:rPr lang="en-US" smtClean="0"/>
-              <a:t>‹Nr.›</a:t>
+              <a:t>‹#›</a:t>
             </a:fld>
             <a:endParaRPr lang="en-US"/>
           </a:p>
@@ -1753,7 +1753,7 @@
           <a:p>
             <a:fld id="{A2ACB64B-D1A6-7D41-9BDE-3BC41FA5B95B}" type="slidenum">
               <a:rPr lang="en-US" smtClean="0"/>
-              <a:t>‹Nr.›</a:t>
+              <a:t>‹#›</a:t>
             </a:fld>
             <a:endParaRPr lang="en-US"/>
           </a:p>
@@ -2120,7 +2120,7 @@
           <a:p>
             <a:fld id="{A2ACB64B-D1A6-7D41-9BDE-3BC41FA5B95B}" type="slidenum">
               <a:rPr lang="en-US" smtClean="0"/>
-              <a:t>‹Nr.›</a:t>
+              <a:t>‹#›</a:t>
             </a:fld>
             <a:endParaRPr lang="en-US"/>
           </a:p>
@@ -2238,7 +2238,7 @@
           <a:p>
             <a:fld id="{A2ACB64B-D1A6-7D41-9BDE-3BC41FA5B95B}" type="slidenum">
               <a:rPr lang="en-US" smtClean="0"/>
-              <a:t>‹Nr.›</a:t>
+              <a:t>‹#›</a:t>
             </a:fld>
             <a:endParaRPr lang="en-US"/>
           </a:p>
@@ -2333,7 +2333,7 @@
           <a:p>
             <a:fld id="{A2ACB64B-D1A6-7D41-9BDE-3BC41FA5B95B}" type="slidenum">
               <a:rPr lang="en-US" smtClean="0"/>
-              <a:t>‹Nr.›</a:t>
+              <a:t>‹#›</a:t>
             </a:fld>
             <a:endParaRPr lang="en-US"/>
           </a:p>
@@ -2610,7 +2610,7 @@
           <a:p>
             <a:fld id="{A2ACB64B-D1A6-7D41-9BDE-3BC41FA5B95B}" type="slidenum">
               <a:rPr lang="en-US" smtClean="0"/>
-              <a:t>‹Nr.›</a:t>
+              <a:t>‹#›</a:t>
             </a:fld>
             <a:endParaRPr lang="en-US"/>
           </a:p>
@@ -2867,7 +2867,7 @@
           <a:p>
             <a:fld id="{A2ACB64B-D1A6-7D41-9BDE-3BC41FA5B95B}" type="slidenum">
               <a:rPr lang="en-US" smtClean="0"/>
-              <a:t>‹Nr.›</a:t>
+              <a:t>‹#›</a:t>
             </a:fld>
             <a:endParaRPr lang="en-US"/>
           </a:p>
@@ -3116,7 +3116,7 @@
           <a:p>
             <a:fld id="{A2ACB64B-D1A6-7D41-9BDE-3BC41FA5B95B}" type="slidenum">
               <a:rPr lang="en-US" smtClean="0"/>
-              <a:t>‹Nr.›</a:t>
+              <a:t>‹#›</a:t>
             </a:fld>
             <a:endParaRPr lang="en-US"/>
           </a:p>
@@ -3530,7 +3530,7 @@
         </p:blipFill>
         <p:spPr>
           <a:xfrm>
-            <a:off x="11116405" y="8074186"/>
+            <a:off x="11116405" y="8112286"/>
             <a:ext cx="6473267" cy="3136920"/>
           </a:xfrm>
           <a:prstGeom prst="rect">
@@ -3861,8 +3861,8 @@
         </p:nvSpPr>
         <p:spPr>
           <a:xfrm>
-            <a:off x="15977907" y="36351633"/>
-            <a:ext cx="7850849" cy="4401205"/>
+            <a:off x="15977907" y="36427833"/>
+            <a:ext cx="7850849" cy="4093428"/>
           </a:xfrm>
           <a:prstGeom prst="rect">
             <a:avLst/>
@@ -3946,7 +3946,7 @@
                   </a:schemeClr>
                 </a:solidFill>
               </a:rPr>
-              <a:t>Global Approaches in Studying RNA-Binding Protein Interaction Networks, 2020, Trends in Biochemical Sciences.pdf</a:t>
+              <a:t>Global Approaches in Studying RNA-Binding Protein Interaction Networks, 2020, Trends in Biochemical Sciences</a:t>
             </a:r>
           </a:p>
           <a:p>
@@ -4007,7 +4007,7 @@
                   </a:schemeClr>
                 </a:solidFill>
               </a:rPr>
-              <a:t> Proteome-wide and Quantitative Identification of RNA-Dependent Proteins by Density Gradient Ultracentrifugation, 2019, Molecular Cell.pdf</a:t>
+              <a:t> Proteome-wide and Quantitative Identification of RNA-Dependent Proteins by Density Gradient Ultracentrifugation, 2019, Molecular Cell</a:t>
             </a:r>
           </a:p>
           <a:p>
@@ -4046,7 +4046,29 @@
                   </a:schemeClr>
                 </a:solidFill>
               </a:rPr>
-              <a:t>Identification, quantification and bioinformatic analysis of RNA-dependent proteins by RNase treatment and density gradient ultracentrifugation using R-DeeP-2020-Nature Protocols_1.pdf</a:t>
+              <a:t>Identification, quantification and bioinformatic analysis of RNA-dependent proteins by RNase treatment and density gradient ultracentrifugation using R-</a:t>
+            </a:r>
+            <a:r>
+              <a:rPr lang="en-US" sz="2000" noProof="0" dirty="0" err="1">
+                <a:solidFill>
+                  <a:schemeClr val="tx1">
+                    <a:lumMod val="65000"/>
+                    <a:lumOff val="35000"/>
+                  </a:schemeClr>
+                </a:solidFill>
+              </a:rPr>
+              <a:t>DeeP</a:t>
+            </a:r>
+            <a:r>
+              <a:rPr lang="en-US" sz="2000" noProof="0" dirty="0">
+                <a:solidFill>
+                  <a:schemeClr val="tx1">
+                    <a:lumMod val="65000"/>
+                    <a:lumOff val="35000"/>
+                  </a:schemeClr>
+                </a:solidFill>
+              </a:rPr>
+              <a:t>, 2020, Nature Protocols</a:t>
             </a:r>
           </a:p>
           <a:p>
@@ -4085,8 +4107,16 @@
                   </a:schemeClr>
                 </a:solidFill>
               </a:rPr>
-              <a:t>, How RNA-Binding Proteins Interact with RNA Molecules and Mechanisms, 2020, Molecular Cell.pdf</a:t>
-            </a:r>
+              <a:t>, How RNA-Binding Proteins Interact with RNA Molecules and Mechanisms, 2020, Molecular Cell</a:t>
+            </a:r>
+            <a:endParaRPr lang="en-US" sz="2000" dirty="0">
+              <a:solidFill>
+                <a:schemeClr val="tx1">
+                  <a:lumMod val="65000"/>
+                  <a:lumOff val="35000"/>
+                </a:schemeClr>
+              </a:solidFill>
+            </a:endParaRPr>
           </a:p>
           <a:p>
             <a:pPr marL="457200" indent="-457200">
@@ -4094,7 +4124,7 @@
               <a:buChar char="•"/>
             </a:pPr>
             <a:r>
-              <a:rPr lang="en-US" sz="2000" noProof="0" dirty="0">
+              <a:rPr lang="de-DE" sz="2000" dirty="0">
                 <a:solidFill>
                   <a:schemeClr val="tx1">
                     <a:lumMod val="65000"/>
@@ -4102,51 +4132,7 @@
                   </a:schemeClr>
                 </a:solidFill>
               </a:rPr>
-              <a:t>Rajagopal </a:t>
-            </a:r>
-            <a:r>
-              <a:rPr lang="en-US" sz="2000" i="1" noProof="0" dirty="0">
-                <a:solidFill>
-                  <a:schemeClr val="tx1">
-                    <a:lumMod val="65000"/>
-                    <a:lumOff val="35000"/>
-                  </a:schemeClr>
-                </a:solidFill>
-              </a:rPr>
-              <a:t>et al.</a:t>
-            </a:r>
-            <a:r>
-              <a:rPr lang="en-US" sz="2000" noProof="0" dirty="0">
-                <a:solidFill>
-                  <a:schemeClr val="tx1">
-                    <a:lumMod val="65000"/>
-                    <a:lumOff val="35000"/>
-                  </a:schemeClr>
-                </a:solidFill>
-              </a:rPr>
-              <a:t>, An atlas of RNA-dependent proteins in cell division reveals the </a:t>
-            </a:r>
-            <a:r>
-              <a:rPr lang="en-US" sz="2000" noProof="0" dirty="0" err="1">
-                <a:solidFill>
-                  <a:schemeClr val="tx1">
-                    <a:lumMod val="65000"/>
-                    <a:lumOff val="35000"/>
-                  </a:schemeClr>
-                </a:solidFill>
-              </a:rPr>
-              <a:t>riboregulation</a:t>
-            </a:r>
-            <a:r>
-              <a:rPr lang="en-US" sz="2000" noProof="0" dirty="0">
-                <a:solidFill>
-                  <a:schemeClr val="tx1">
-                    <a:lumMod val="65000"/>
-                    <a:lumOff val="35000"/>
-                  </a:schemeClr>
-                </a:solidFill>
-              </a:rPr>
-              <a:t> of mitotic protein-protein interactions. Nat. Commun. 16, 2325 (2025).pdf</a:t>
+              <a:t>Caudron-Herger et al., RBP2GO: a comprehensive pan-species database on RNA-binding proteins, their interactions and functions, 2021, Nucleic Acids Research</a:t>
             </a:r>
           </a:p>
         </p:txBody>
@@ -4463,7 +4449,7 @@
         </p:nvSpPr>
         <p:spPr>
           <a:xfrm>
-            <a:off x="1568156" y="2264310"/>
+            <a:off x="1586132" y="2266675"/>
             <a:ext cx="28358864" cy="1836887"/>
           </a:xfrm>
           <a:prstGeom prst="rect">
@@ -4541,7 +4527,7 @@
         </p:nvSpPr>
         <p:spPr>
           <a:xfrm>
-            <a:off x="8739451" y="3780826"/>
+            <a:off x="9322471" y="3721844"/>
             <a:ext cx="12850233" cy="1323687"/>
           </a:xfrm>
           <a:prstGeom prst="rect">
@@ -4881,10 +4867,10 @@
         </p:nvGrpSpPr>
         <p:grpSpPr>
           <a:xfrm>
-            <a:off x="17791293" y="15365966"/>
-            <a:ext cx="11762833" cy="8488124"/>
+            <a:off x="17791293" y="15537416"/>
+            <a:ext cx="11762833" cy="8334236"/>
             <a:chOff x="13611050" y="15923651"/>
-            <a:chExt cx="11762833" cy="8488124"/>
+            <a:chExt cx="11762833" cy="8334236"/>
           </a:xfrm>
         </p:grpSpPr>
         <p:grpSp>
@@ -5232,8 +5218,8 @@
           </p:nvSpPr>
           <p:spPr>
             <a:xfrm>
-              <a:off x="13845074" y="21857230"/>
-              <a:ext cx="11359369" cy="2554545"/>
+              <a:off x="13845075" y="21857230"/>
+              <a:ext cx="11029006" cy="2400657"/>
             </a:xfrm>
             <a:prstGeom prst="rect">
               <a:avLst/>
@@ -5274,7 +5260,10 @@
             </a:p>
             <a:p>
               <a:pPr algn="just"/>
-              <a:endParaRPr lang="en-US" sz="2000" noProof="0" dirty="0"/>
+              <a:r>
+                <a:rPr lang="en-US" sz="1000" noProof="0" dirty="0"/>
+                <a:t> </a:t>
+              </a:r>
             </a:p>
             <a:p>
               <a:pPr algn="just"/>
@@ -5432,7 +5421,10 @@
                   </a:r>
                 </a:p>
                 <a:p>
-                  <a:endParaRPr lang="en-US" sz="2000" noProof="0" dirty="0"/>
+                  <a:r>
+                    <a:rPr lang="en-US" sz="2000" noProof="0" dirty="0"/>
+                    <a:t> </a:t>
+                  </a:r>
                 </a:p>
                 <a:p>
                   <a:r>
@@ -5987,8 +5979,8 @@
         </p:nvSpPr>
         <p:spPr>
           <a:xfrm>
-            <a:off x="1007582" y="21616027"/>
-            <a:ext cx="6432365" cy="3477875"/>
+            <a:off x="1007582" y="21673177"/>
+            <a:ext cx="6669568" cy="3323987"/>
           </a:xfrm>
           <a:prstGeom prst="rect">
             <a:avLst/>
@@ -6012,7 +6004,7 @@
           </a:p>
           <a:p>
             <a:r>
-              <a:rPr lang="en-US" sz="1400" noProof="0" dirty="0"/>
+              <a:rPr lang="en-US" sz="1000" noProof="0" dirty="0"/>
               <a:t> </a:t>
             </a:r>
           </a:p>
@@ -6139,10 +6131,10 @@
         </p:nvGrpSpPr>
         <p:grpSpPr>
           <a:xfrm>
-            <a:off x="8067477" y="15386939"/>
-            <a:ext cx="4005104" cy="4498491"/>
-            <a:chOff x="8077058" y="15538766"/>
-            <a:chExt cx="4308757" cy="4839548"/>
+            <a:off x="8410377" y="15502709"/>
+            <a:ext cx="4005104" cy="4382741"/>
+            <a:chOff x="8077058" y="15663296"/>
+            <a:chExt cx="4308757" cy="4715018"/>
           </a:xfrm>
         </p:grpSpPr>
         <p:sp>
@@ -6159,8 +6151,8 @@
           </p:nvSpPr>
           <p:spPr>
             <a:xfrm>
-              <a:off x="8077058" y="15538766"/>
-              <a:ext cx="615174" cy="461665"/>
+              <a:off x="8077058" y="15663296"/>
+              <a:ext cx="615174" cy="461664"/>
             </a:xfrm>
             <a:prstGeom prst="rect">
               <a:avLst/>
@@ -6357,8 +6349,8 @@
         </p:nvSpPr>
         <p:spPr>
           <a:xfrm>
-            <a:off x="12192002" y="20454912"/>
-            <a:ext cx="5151465" cy="4832092"/>
+            <a:off x="12278649" y="20454912"/>
+            <a:ext cx="4849144" cy="4478149"/>
           </a:xfrm>
           <a:prstGeom prst="rect">
             <a:avLst/>
@@ -6381,7 +6373,10 @@
             </a:r>
           </a:p>
           <a:p>
-            <a:endParaRPr lang="en-US" sz="1400" dirty="0"/>
+            <a:r>
+              <a:rPr lang="en-US" sz="1000" dirty="0"/>
+              <a:t> </a:t>
+            </a:r>
           </a:p>
           <a:p>
             <a:r>
@@ -6406,10 +6401,7 @@
             </a:r>
           </a:p>
           <a:p>
-            <a:endParaRPr lang="en-US" sz="2000" dirty="0"/>
-          </a:p>
-          <a:p>
-            <a:endParaRPr lang="en-US" sz="2000" b="1" dirty="0"/>
+            <a:endParaRPr lang="en-US" sz="2500" b="1" dirty="0"/>
           </a:p>
           <a:p>
             <a:r>
@@ -6430,7 +6422,10 @@
             </a:r>
           </a:p>
           <a:p>
-            <a:endParaRPr lang="en-US" sz="1400" dirty="0"/>
+            <a:r>
+              <a:rPr lang="en-US" sz="1000" dirty="0"/>
+              <a:t> </a:t>
+            </a:r>
           </a:p>
           <a:p>
             <a:r>
@@ -6473,7 +6468,7 @@
         </p:nvGrpSpPr>
         <p:grpSpPr>
           <a:xfrm>
-            <a:off x="12611000" y="15495464"/>
+            <a:off x="13087250" y="15495464"/>
             <a:ext cx="3889075" cy="4404606"/>
             <a:chOff x="12804710" y="15579033"/>
             <a:chExt cx="4157729" cy="4763267"/>
@@ -6856,10 +6851,10 @@
         </p:nvGrpSpPr>
         <p:grpSpPr>
           <a:xfrm>
-            <a:off x="10989482" y="7888878"/>
-            <a:ext cx="7053033" cy="4986588"/>
-            <a:chOff x="10957242" y="7853349"/>
-            <a:chExt cx="7053033" cy="4986588"/>
+            <a:off x="10989482" y="7965078"/>
+            <a:ext cx="7053033" cy="4886933"/>
+            <a:chOff x="10957242" y="7929549"/>
+            <a:chExt cx="7053033" cy="4886933"/>
           </a:xfrm>
         </p:grpSpPr>
         <p:sp>
@@ -6876,8 +6871,8 @@
           </p:nvSpPr>
           <p:spPr>
             <a:xfrm>
-              <a:off x="10957242" y="11301054"/>
-              <a:ext cx="7053033" cy="1538883"/>
+              <a:off x="10957242" y="11339154"/>
+              <a:ext cx="7053033" cy="1477328"/>
             </a:xfrm>
             <a:prstGeom prst="rect">
               <a:avLst/>
@@ -6902,11 +6897,11 @@
                 <a:rPr lang="en-US" sz="2000" dirty="0"/>
               </a:br>
               <a:r>
-                <a:rPr lang="en-US" sz="1400" dirty="0"/>
+                <a:rPr lang="en-US" sz="1000" dirty="0"/>
                 <a:t> </a:t>
               </a:r>
               <a:r>
-                <a:rPr lang="en-GB" sz="1400" dirty="0"/>
+                <a:rPr lang="en-GB" sz="1000" dirty="0"/>
                 <a:t>  </a:t>
               </a:r>
             </a:p>
@@ -6940,7 +6935,7 @@
           </p:nvSpPr>
           <p:spPr>
             <a:xfrm>
-              <a:off x="10989388" y="7853349"/>
+              <a:off x="10989388" y="7929549"/>
               <a:ext cx="648470" cy="461665"/>
             </a:xfrm>
             <a:prstGeom prst="rect">
@@ -7092,10 +7087,10 @@
         </p:nvGrpSpPr>
         <p:grpSpPr>
           <a:xfrm>
-            <a:off x="18659378" y="7885058"/>
-            <a:ext cx="11005390" cy="4971664"/>
-            <a:chOff x="18659378" y="7885058"/>
-            <a:chExt cx="11005390" cy="4971664"/>
+            <a:off x="18659378" y="7942208"/>
+            <a:ext cx="11005390" cy="4910109"/>
+            <a:chOff x="18659378" y="7942208"/>
+            <a:chExt cx="11005390" cy="4910109"/>
           </a:xfrm>
         </p:grpSpPr>
         <p:sp>
@@ -7112,7 +7107,7 @@
           </p:nvSpPr>
           <p:spPr>
             <a:xfrm>
-              <a:off x="18662854" y="7895284"/>
+              <a:off x="18662854" y="7952434"/>
               <a:ext cx="5059709" cy="461665"/>
             </a:xfrm>
             <a:prstGeom prst="rect">
@@ -7159,8 +7154,8 @@
           </p:nvSpPr>
           <p:spPr>
             <a:xfrm>
-              <a:off x="18659378" y="11625616"/>
-              <a:ext cx="11005390" cy="1231106"/>
+              <a:off x="18659378" y="11682766"/>
+              <a:ext cx="11005390" cy="1169551"/>
             </a:xfrm>
             <a:prstGeom prst="rect">
               <a:avLst/>
@@ -7192,8 +7187,8 @@
             </a:p>
             <a:p>
               <a:r>
-                <a:rPr lang="en-GB" sz="1400" noProof="0" dirty="0"/>
-                <a:t> </a:t>
+                <a:rPr lang="en-GB" sz="1000" noProof="0" dirty="0"/>
+                <a:t>  </a:t>
               </a:r>
             </a:p>
             <a:p>
@@ -7235,7 +7230,7 @@
           </p:nvSpPr>
           <p:spPr>
             <a:xfrm>
-              <a:off x="24073076" y="7885058"/>
+              <a:off x="24073076" y="7942208"/>
               <a:ext cx="5229115" cy="461665"/>
             </a:xfrm>
             <a:prstGeom prst="rect">
@@ -7287,7 +7282,7 @@
           </p:blipFill>
           <p:spPr>
             <a:xfrm>
-              <a:off x="19102199" y="8264290"/>
+              <a:off x="19102199" y="8321440"/>
               <a:ext cx="4726558" cy="2917628"/>
             </a:xfrm>
             <a:prstGeom prst="rect">
@@ -7317,7 +7312,7 @@
           </p:blipFill>
           <p:spPr>
             <a:xfrm>
-              <a:off x="24510576" y="8264290"/>
+              <a:off x="24510576" y="8321440"/>
               <a:ext cx="4726558" cy="2917628"/>
             </a:xfrm>
             <a:prstGeom prst="rect">
@@ -7339,7 +7334,7 @@
           </p:nvSpPr>
           <p:spPr>
             <a:xfrm rot="16200000">
-              <a:off x="18519995" y="9385097"/>
+              <a:off x="18519995" y="9442247"/>
               <a:ext cx="795075" cy="369332"/>
             </a:xfrm>
             <a:prstGeom prst="rect">
@@ -7374,7 +7369,7 @@
           </p:nvSpPr>
           <p:spPr>
             <a:xfrm rot="16200000">
-              <a:off x="23899129" y="9385097"/>
+              <a:off x="23899129" y="9442247"/>
               <a:ext cx="795075" cy="369332"/>
             </a:xfrm>
             <a:prstGeom prst="rect">
@@ -7409,7 +7404,7 @@
           </p:nvSpPr>
           <p:spPr>
             <a:xfrm>
-              <a:off x="20114893" y="11119786"/>
+              <a:off x="20114893" y="11176936"/>
               <a:ext cx="3001654" cy="369332"/>
             </a:xfrm>
             <a:prstGeom prst="rect">
@@ -7445,7 +7440,7 @@
           </p:nvSpPr>
           <p:spPr>
             <a:xfrm>
-              <a:off x="25625712" y="11119786"/>
+              <a:off x="25625712" y="11176936"/>
               <a:ext cx="3001654" cy="369332"/>
             </a:xfrm>
             <a:prstGeom prst="rect">
@@ -7483,7 +7478,7 @@
         <p:grpSpPr>
           <a:xfrm>
             <a:off x="1063808" y="15685474"/>
-            <a:ext cx="6184204" cy="5716407"/>
+            <a:ext cx="6643920" cy="5776208"/>
             <a:chOff x="2552324" y="2545614"/>
             <a:chExt cx="9612409" cy="7298822"/>
           </a:xfrm>
@@ -8618,7 +8613,7 @@
         <p:spPr>
           <a:xfrm>
             <a:off x="16283896" y="32241634"/>
-            <a:ext cx="13100790" cy="1231106"/>
+            <a:ext cx="13100790" cy="1169551"/>
           </a:xfrm>
           <a:prstGeom prst="rect">
             <a:avLst/>
@@ -8642,8 +8637,8 @@
           </a:p>
           <a:p>
             <a:r>
-              <a:rPr lang="en-US" sz="1400" noProof="0" dirty="0"/>
-              <a:t> </a:t>
+              <a:rPr lang="en-US" sz="1000" noProof="0" dirty="0"/>
+              <a:t>  </a:t>
             </a:r>
           </a:p>
           <a:p>
@@ -9196,7 +9191,7 @@
         </p:nvCxnSpPr>
         <p:spPr>
           <a:xfrm flipV="1">
-            <a:off x="7696200" y="15314410"/>
+            <a:off x="8020050" y="15314410"/>
             <a:ext cx="0" cy="9932643"/>
           </a:xfrm>
           <a:prstGeom prst="line">
@@ -9237,7 +9232,7 @@
         </p:nvCxnSpPr>
         <p:spPr>
           <a:xfrm flipV="1">
-            <a:off x="17604044" y="15314410"/>
+            <a:off x="17470694" y="15314410"/>
             <a:ext cx="0" cy="9932643"/>
           </a:xfrm>
           <a:prstGeom prst="line">
@@ -9264,171 +9259,6 @@
           </a:fontRef>
         </p:style>
       </p:cxnSp>
-      <p:grpSp>
-        <p:nvGrpSpPr>
-          <p:cNvPr id="2" name="Gruppieren 1">
-            <a:extLst>
-              <a:ext uri="{FF2B5EF4-FFF2-40B4-BE49-F238E27FC236}">
-                <a16:creationId xmlns:a16="http://schemas.microsoft.com/office/drawing/2014/main" id="{F6C9AB0D-466F-68C0-5166-7D9D509059EF}"/>
-              </a:ext>
-            </a:extLst>
-          </p:cNvPr>
-          <p:cNvGrpSpPr/>
-          <p:nvPr/>
-        </p:nvGrpSpPr>
-        <p:grpSpPr>
-          <a:xfrm>
-            <a:off x="8304237" y="20407345"/>
-            <a:ext cx="3280760" cy="4659622"/>
-            <a:chOff x="13310632" y="15379421"/>
-            <a:chExt cx="3280760" cy="4659622"/>
-          </a:xfrm>
-        </p:grpSpPr>
-        <p:sp>
-          <p:nvSpPr>
-            <p:cNvPr id="168" name="Textfeld 85">
-              <a:extLst>
-                <a:ext uri="{FF2B5EF4-FFF2-40B4-BE49-F238E27FC236}">
-                  <a16:creationId xmlns:a16="http://schemas.microsoft.com/office/drawing/2014/main" id="{DF96E19C-8BC2-A642-00A8-E5727AACD5B7}"/>
-                </a:ext>
-              </a:extLst>
-            </p:cNvPr>
-            <p:cNvSpPr txBox="1"/>
-            <p:nvPr/>
-          </p:nvSpPr>
-          <p:spPr>
-            <a:xfrm>
-              <a:off x="13462143" y="15582091"/>
-              <a:ext cx="3129249" cy="707886"/>
-            </a:xfrm>
-            <a:prstGeom prst="rect">
-              <a:avLst/>
-            </a:prstGeom>
-            <a:noFill/>
-          </p:spPr>
-          <p:txBody>
-            <a:bodyPr wrap="square" rtlCol="0">
-              <a:spAutoFit/>
-            </a:bodyPr>
-            <a:lstStyle/>
-            <a:p>
-              <a:pPr algn="ctr"/>
-              <a:r>
-                <a:rPr lang="en-US" sz="2000" noProof="0" dirty="0"/>
-                <a:t>Isoelectric points of </a:t>
-              </a:r>
-              <a:r>
-                <a:rPr lang="en-US" sz="2000" b="1" dirty="0"/>
-                <a:t>s</a:t>
-              </a:r>
-              <a:r>
-                <a:rPr lang="en-US" sz="2000" b="1" noProof="0" dirty="0"/>
-                <a:t>elected proteins</a:t>
-              </a:r>
-            </a:p>
-          </p:txBody>
-        </p:sp>
-        <p:pic>
-          <p:nvPicPr>
-            <p:cNvPr id="47" name="Picture 46">
-              <a:extLst>
-                <a:ext uri="{FF2B5EF4-FFF2-40B4-BE49-F238E27FC236}">
-                  <a16:creationId xmlns:a16="http://schemas.microsoft.com/office/drawing/2014/main" id="{929F86DB-0AC7-5E70-1E3A-4EA2A0E17244}"/>
-                </a:ext>
-              </a:extLst>
-            </p:cNvPr>
-            <p:cNvPicPr>
-              <a:picLocks noChangeAspect="1"/>
-            </p:cNvPicPr>
-            <p:nvPr/>
-          </p:nvPicPr>
-          <p:blipFill>
-            <a:blip r:embed="rId25"/>
-            <a:stretch>
-              <a:fillRect/>
-            </a:stretch>
-          </p:blipFill>
-          <p:spPr>
-            <a:xfrm>
-              <a:off x="13360541" y="16227065"/>
-              <a:ext cx="3129249" cy="3405360"/>
-            </a:xfrm>
-            <a:prstGeom prst="rect">
-              <a:avLst/>
-            </a:prstGeom>
-          </p:spPr>
-        </p:pic>
-        <p:sp>
-          <p:nvSpPr>
-            <p:cNvPr id="49" name="Textfeld 105">
-              <a:extLst>
-                <a:ext uri="{FF2B5EF4-FFF2-40B4-BE49-F238E27FC236}">
-                  <a16:creationId xmlns:a16="http://schemas.microsoft.com/office/drawing/2014/main" id="{676F039A-23B5-5917-2698-3CB282BA75C4}"/>
-                </a:ext>
-              </a:extLst>
-            </p:cNvPr>
-            <p:cNvSpPr txBox="1"/>
-            <p:nvPr/>
-          </p:nvSpPr>
-          <p:spPr>
-            <a:xfrm>
-              <a:off x="14252423" y="19669711"/>
-              <a:ext cx="1772372" cy="369332"/>
-            </a:xfrm>
-            <a:prstGeom prst="rect">
-              <a:avLst/>
-            </a:prstGeom>
-            <a:noFill/>
-          </p:spPr>
-          <p:txBody>
-            <a:bodyPr wrap="square" rtlCol="0">
-              <a:spAutoFit/>
-            </a:bodyPr>
-            <a:lstStyle/>
-            <a:p>
-              <a:r>
-                <a:rPr lang="en-US" noProof="0" dirty="0"/>
-                <a:t>Isoelectric point</a:t>
-              </a:r>
-            </a:p>
-          </p:txBody>
-        </p:sp>
-        <p:sp>
-          <p:nvSpPr>
-            <p:cNvPr id="73" name="Textfeld 12">
-              <a:extLst>
-                <a:ext uri="{FF2B5EF4-FFF2-40B4-BE49-F238E27FC236}">
-                  <a16:creationId xmlns:a16="http://schemas.microsoft.com/office/drawing/2014/main" id="{3F728CDE-2FE7-C318-0257-439B05B34637}"/>
-                </a:ext>
-              </a:extLst>
-            </p:cNvPr>
-            <p:cNvSpPr txBox="1"/>
-            <p:nvPr/>
-          </p:nvSpPr>
-          <p:spPr>
-            <a:xfrm>
-              <a:off x="13310632" y="15379421"/>
-              <a:ext cx="571821" cy="461665"/>
-            </a:xfrm>
-            <a:prstGeom prst="rect">
-              <a:avLst/>
-            </a:prstGeom>
-            <a:noFill/>
-          </p:spPr>
-          <p:txBody>
-            <a:bodyPr wrap="square" rtlCol="0">
-              <a:spAutoFit/>
-            </a:bodyPr>
-            <a:lstStyle/>
-            <a:p>
-              <a:r>
-                <a:rPr lang="en-US" sz="2400" b="1" noProof="0" dirty="0"/>
-                <a:t>5</a:t>
-              </a:r>
-            </a:p>
-          </p:txBody>
-        </p:sp>
-      </p:grpSp>
       <p:cxnSp>
         <p:nvCxnSpPr>
           <p:cNvPr id="81" name="Straight Connector 80">
@@ -9515,6 +9345,228 @@
           </a:fontRef>
         </p:style>
       </p:cxnSp>
+      <p:grpSp>
+        <p:nvGrpSpPr>
+          <p:cNvPr id="64" name="Group 63">
+            <a:extLst>
+              <a:ext uri="{FF2B5EF4-FFF2-40B4-BE49-F238E27FC236}">
+                <a16:creationId xmlns:a16="http://schemas.microsoft.com/office/drawing/2014/main" id="{29DB901C-47AF-ED3A-BF55-5CC74E96F1C1}"/>
+              </a:ext>
+            </a:extLst>
+          </p:cNvPr>
+          <p:cNvGrpSpPr/>
+          <p:nvPr/>
+        </p:nvGrpSpPr>
+        <p:grpSpPr>
+          <a:xfrm>
+            <a:off x="8469932" y="20337409"/>
+            <a:ext cx="3631581" cy="4498064"/>
+            <a:chOff x="8127032" y="20568903"/>
+            <a:chExt cx="3631581" cy="4498064"/>
+          </a:xfrm>
+        </p:grpSpPr>
+        <p:grpSp>
+          <p:nvGrpSpPr>
+            <p:cNvPr id="2" name="Gruppieren 1">
+              <a:extLst>
+                <a:ext uri="{FF2B5EF4-FFF2-40B4-BE49-F238E27FC236}">
+                  <a16:creationId xmlns:a16="http://schemas.microsoft.com/office/drawing/2014/main" id="{F6C9AB0D-466F-68C0-5166-7D9D509059EF}"/>
+                </a:ext>
+              </a:extLst>
+            </p:cNvPr>
+            <p:cNvGrpSpPr/>
+            <p:nvPr/>
+          </p:nvGrpSpPr>
+          <p:grpSpPr>
+            <a:xfrm>
+              <a:off x="8127032" y="20568903"/>
+              <a:ext cx="3631581" cy="4498064"/>
+              <a:chOff x="12959811" y="15540979"/>
+              <a:chExt cx="3631581" cy="4498064"/>
+            </a:xfrm>
+          </p:grpSpPr>
+          <p:sp>
+            <p:nvSpPr>
+              <p:cNvPr id="168" name="Textfeld 85">
+                <a:extLst>
+                  <a:ext uri="{FF2B5EF4-FFF2-40B4-BE49-F238E27FC236}">
+                    <a16:creationId xmlns:a16="http://schemas.microsoft.com/office/drawing/2014/main" id="{DF96E19C-8BC2-A642-00A8-E5727AACD5B7}"/>
+                  </a:ext>
+                </a:extLst>
+              </p:cNvPr>
+              <p:cNvSpPr txBox="1"/>
+              <p:nvPr/>
+            </p:nvSpPr>
+            <p:spPr>
+              <a:xfrm>
+                <a:off x="13462143" y="15582091"/>
+                <a:ext cx="3129249" cy="707886"/>
+              </a:xfrm>
+              <a:prstGeom prst="rect">
+                <a:avLst/>
+              </a:prstGeom>
+              <a:noFill/>
+            </p:spPr>
+            <p:txBody>
+              <a:bodyPr wrap="square" rtlCol="0">
+                <a:spAutoFit/>
+              </a:bodyPr>
+              <a:lstStyle/>
+              <a:p>
+                <a:pPr algn="ctr"/>
+                <a:r>
+                  <a:rPr lang="en-US" sz="2000" noProof="0" dirty="0"/>
+                  <a:t>Isoelectric points of </a:t>
+                </a:r>
+                <a:r>
+                  <a:rPr lang="en-US" sz="2000" b="1" dirty="0"/>
+                  <a:t>s</a:t>
+                </a:r>
+                <a:r>
+                  <a:rPr lang="en-US" sz="2000" b="1" noProof="0" dirty="0"/>
+                  <a:t>elected proteins</a:t>
+                </a:r>
+              </a:p>
+            </p:txBody>
+          </p:sp>
+          <p:pic>
+            <p:nvPicPr>
+              <p:cNvPr id="47" name="Picture 46">
+                <a:extLst>
+                  <a:ext uri="{FF2B5EF4-FFF2-40B4-BE49-F238E27FC236}">
+                    <a16:creationId xmlns:a16="http://schemas.microsoft.com/office/drawing/2014/main" id="{929F86DB-0AC7-5E70-1E3A-4EA2A0E17244}"/>
+                  </a:ext>
+                </a:extLst>
+              </p:cNvPr>
+              <p:cNvPicPr>
+                <a:picLocks noChangeAspect="1"/>
+              </p:cNvPicPr>
+              <p:nvPr/>
+            </p:nvPicPr>
+            <p:blipFill>
+              <a:blip r:embed="rId25"/>
+              <a:stretch>
+                <a:fillRect/>
+              </a:stretch>
+            </p:blipFill>
+            <p:spPr>
+              <a:xfrm>
+                <a:off x="13360541" y="16227065"/>
+                <a:ext cx="3129249" cy="3405360"/>
+              </a:xfrm>
+              <a:prstGeom prst="rect">
+                <a:avLst/>
+              </a:prstGeom>
+            </p:spPr>
+          </p:pic>
+          <p:sp>
+            <p:nvSpPr>
+              <p:cNvPr id="49" name="Textfeld 105">
+                <a:extLst>
+                  <a:ext uri="{FF2B5EF4-FFF2-40B4-BE49-F238E27FC236}">
+                    <a16:creationId xmlns:a16="http://schemas.microsoft.com/office/drawing/2014/main" id="{676F039A-23B5-5917-2698-3CB282BA75C4}"/>
+                  </a:ext>
+                </a:extLst>
+              </p:cNvPr>
+              <p:cNvSpPr txBox="1"/>
+              <p:nvPr/>
+            </p:nvSpPr>
+            <p:spPr>
+              <a:xfrm>
+                <a:off x="14252423" y="19669711"/>
+                <a:ext cx="1772372" cy="369332"/>
+              </a:xfrm>
+              <a:prstGeom prst="rect">
+                <a:avLst/>
+              </a:prstGeom>
+              <a:noFill/>
+            </p:spPr>
+            <p:txBody>
+              <a:bodyPr wrap="square" rtlCol="0">
+                <a:spAutoFit/>
+              </a:bodyPr>
+              <a:lstStyle/>
+              <a:p>
+                <a:r>
+                  <a:rPr lang="en-US" noProof="0" dirty="0"/>
+                  <a:t>Isoelectric point</a:t>
+                </a:r>
+              </a:p>
+            </p:txBody>
+          </p:sp>
+          <p:sp>
+            <p:nvSpPr>
+              <p:cNvPr id="73" name="Textfeld 12">
+                <a:extLst>
+                  <a:ext uri="{FF2B5EF4-FFF2-40B4-BE49-F238E27FC236}">
+                    <a16:creationId xmlns:a16="http://schemas.microsoft.com/office/drawing/2014/main" id="{3F728CDE-2FE7-C318-0257-439B05B34637}"/>
+                  </a:ext>
+                </a:extLst>
+              </p:cNvPr>
+              <p:cNvSpPr txBox="1"/>
+              <p:nvPr/>
+            </p:nvSpPr>
+            <p:spPr>
+              <a:xfrm>
+                <a:off x="12959811" y="15540979"/>
+                <a:ext cx="571821" cy="461665"/>
+              </a:xfrm>
+              <a:prstGeom prst="rect">
+                <a:avLst/>
+              </a:prstGeom>
+              <a:noFill/>
+            </p:spPr>
+            <p:txBody>
+              <a:bodyPr wrap="square" rtlCol="0">
+                <a:spAutoFit/>
+              </a:bodyPr>
+              <a:lstStyle/>
+              <a:p>
+                <a:r>
+                  <a:rPr lang="en-US" sz="2400" b="1" noProof="0" dirty="0"/>
+                  <a:t>5</a:t>
+                </a:r>
+              </a:p>
+            </p:txBody>
+          </p:sp>
+        </p:grpSp>
+        <p:sp>
+          <p:nvSpPr>
+            <p:cNvPr id="17" name="Textfeld 104">
+              <a:extLst>
+                <a:ext uri="{FF2B5EF4-FFF2-40B4-BE49-F238E27FC236}">
+                  <a16:creationId xmlns:a16="http://schemas.microsoft.com/office/drawing/2014/main" id="{306C51CC-06F5-CC80-BB23-D59629616E0A}"/>
+                </a:ext>
+              </a:extLst>
+            </p:cNvPr>
+            <p:cNvSpPr txBox="1"/>
+            <p:nvPr/>
+          </p:nvSpPr>
+          <p:spPr>
+            <a:xfrm rot="16200000">
+              <a:off x="6844735" y="22587113"/>
+              <a:ext cx="2957584" cy="369332"/>
+            </a:xfrm>
+            <a:prstGeom prst="rect">
+              <a:avLst/>
+            </a:prstGeom>
+            <a:noFill/>
+          </p:spPr>
+          <p:txBody>
+            <a:bodyPr wrap="square" rtlCol="0">
+              <a:spAutoFit/>
+            </a:bodyPr>
+            <a:lstStyle/>
+            <a:p>
+              <a:pPr algn="ctr"/>
+              <a:r>
+                <a:rPr lang="en-US" noProof="0" dirty="0"/>
+                <a:t>Frequency</a:t>
+              </a:r>
+            </a:p>
+          </p:txBody>
+        </p:sp>
+      </p:grpSp>
     </p:spTree>
     <p:extLst>
       <p:ext uri="{BB962C8B-B14F-4D97-AF65-F5344CB8AC3E}">

</xml_diff>